<commit_message>
Final updates to UML lecture
</commit_message>
<xml_diff>
--- a/presentations/03-uml-class-diagramming.pptx
+++ b/presentations/03-uml-class-diagramming.pptx
@@ -5,7 +5,7 @@
     <p:sldMasterId id="2147483738" r:id="rId1"/>
   </p:sldMasterIdLst>
   <p:notesMasterIdLst>
-    <p:notesMasterId r:id="rId31"/>
+    <p:notesMasterId r:id="rId34"/>
   </p:notesMasterIdLst>
   <p:sldIdLst>
     <p:sldId id="256" r:id="rId2"/>
@@ -16,27 +16,30 @@
     <p:sldId id="261" r:id="rId7"/>
     <p:sldId id="262" r:id="rId8"/>
     <p:sldId id="263" r:id="rId9"/>
-    <p:sldId id="264" r:id="rId10"/>
-    <p:sldId id="265" r:id="rId11"/>
-    <p:sldId id="278" r:id="rId12"/>
-    <p:sldId id="279" r:id="rId13"/>
-    <p:sldId id="280" r:id="rId14"/>
-    <p:sldId id="281" r:id="rId15"/>
-    <p:sldId id="266" r:id="rId16"/>
-    <p:sldId id="267" r:id="rId17"/>
-    <p:sldId id="277" r:id="rId18"/>
-    <p:sldId id="268" r:id="rId19"/>
-    <p:sldId id="269" r:id="rId20"/>
-    <p:sldId id="270" r:id="rId21"/>
-    <p:sldId id="271" r:id="rId22"/>
-    <p:sldId id="272" r:id="rId23"/>
-    <p:sldId id="282" r:id="rId24"/>
-    <p:sldId id="283" r:id="rId25"/>
-    <p:sldId id="273" r:id="rId26"/>
-    <p:sldId id="284" r:id="rId27"/>
-    <p:sldId id="274" r:id="rId28"/>
-    <p:sldId id="276" r:id="rId29"/>
-    <p:sldId id="275" r:id="rId30"/>
+    <p:sldId id="285" r:id="rId10"/>
+    <p:sldId id="286" r:id="rId11"/>
+    <p:sldId id="267" r:id="rId12"/>
+    <p:sldId id="277" r:id="rId13"/>
+    <p:sldId id="265" r:id="rId14"/>
+    <p:sldId id="278" r:id="rId15"/>
+    <p:sldId id="287" r:id="rId16"/>
+    <p:sldId id="264" r:id="rId17"/>
+    <p:sldId id="279" r:id="rId18"/>
+    <p:sldId id="280" r:id="rId19"/>
+    <p:sldId id="281" r:id="rId20"/>
+    <p:sldId id="266" r:id="rId21"/>
+    <p:sldId id="268" r:id="rId22"/>
+    <p:sldId id="269" r:id="rId23"/>
+    <p:sldId id="270" r:id="rId24"/>
+    <p:sldId id="271" r:id="rId25"/>
+    <p:sldId id="272" r:id="rId26"/>
+    <p:sldId id="282" r:id="rId27"/>
+    <p:sldId id="283" r:id="rId28"/>
+    <p:sldId id="273" r:id="rId29"/>
+    <p:sldId id="284" r:id="rId30"/>
+    <p:sldId id="274" r:id="rId31"/>
+    <p:sldId id="276" r:id="rId32"/>
+    <p:sldId id="275" r:id="rId33"/>
   </p:sldIdLst>
   <p:sldSz cx="12192000" cy="6858000"/>
   <p:notesSz cx="6858000" cy="9144000"/>
@@ -568,13 +571,7 @@
   <p:cSld>
     <p:spTree>
       <p:nvGrpSpPr>
-        <p:cNvPr id="1" name="">
-          <a:extLst>
-            <a:ext uri="{FF2B5EF4-FFF2-40B4-BE49-F238E27FC236}">
-              <a16:creationId xmlns:a16="http://schemas.microsoft.com/office/drawing/2014/main" id="{D6630A00-76B5-07BF-E2D8-9B6572ECF8FE}"/>
-            </a:ext>
-          </a:extLst>
-        </p:cNvPr>
+        <p:cNvPr id="1" name=""/>
         <p:cNvGrpSpPr/>
         <p:nvPr/>
       </p:nvGrpSpPr>
@@ -588,13 +585,7 @@
       </p:grpSpPr>
       <p:sp>
         <p:nvSpPr>
-          <p:cNvPr id="2" name="Slide Image Placeholder 1">
-            <a:extLst>
-              <a:ext uri="{FF2B5EF4-FFF2-40B4-BE49-F238E27FC236}">
-                <a16:creationId xmlns:a16="http://schemas.microsoft.com/office/drawing/2014/main" id="{57C80496-6A01-0C63-109B-9701C726B706}"/>
-              </a:ext>
-            </a:extLst>
-          </p:cNvPr>
+          <p:cNvPr id="2" name="Slide Image Placeholder 1"/>
           <p:cNvSpPr>
             <a:spLocks noGrp="1" noRot="1" noChangeAspect="1"/>
           </p:cNvSpPr>
@@ -606,13 +597,7 @@
       </p:sp>
       <p:sp>
         <p:nvSpPr>
-          <p:cNvPr id="3" name="Notes Placeholder 2">
-            <a:extLst>
-              <a:ext uri="{FF2B5EF4-FFF2-40B4-BE49-F238E27FC236}">
-                <a16:creationId xmlns:a16="http://schemas.microsoft.com/office/drawing/2014/main" id="{D749104B-2CC7-8993-882F-19AB3F074B97}"/>
-              </a:ext>
-            </a:extLst>
-          </p:cNvPr>
+          <p:cNvPr id="3" name="Notes Placeholder 2"/>
           <p:cNvSpPr>
             <a:spLocks noGrp="1"/>
           </p:cNvSpPr>
@@ -627,20 +612,14 @@
           <a:p>
             <a:r>
               <a:rPr dirty="0"/>
-              <a:t>Reinforce OO principles here. Interfaces describe capability without commitment. Diagrams make this distinction obvious and visible.</a:t>
-            </a:r>
-          </a:p>
-        </p:txBody>
-      </p:sp>
-      <p:sp>
-        <p:nvSpPr>
-          <p:cNvPr id="4" name="Slide Number Placeholder 3">
-            <a:extLst>
-              <a:ext uri="{FF2B5EF4-FFF2-40B4-BE49-F238E27FC236}">
-                <a16:creationId xmlns:a16="http://schemas.microsoft.com/office/drawing/2014/main" id="{985780CD-101D-FE75-CD92-3F3CF24AD242}"/>
-              </a:ext>
-            </a:extLst>
-          </p:cNvPr>
+              <a:t>Dense or tangled structures are easier to spot in diagrams than in code. This is often where students first notice over-coupling or god classes.</a:t>
+            </a:r>
+          </a:p>
+        </p:txBody>
+      </p:sp>
+      <p:sp>
+        <p:nvSpPr>
+          <p:cNvPr id="4" name="Slide Number Placeholder 3"/>
           <p:cNvSpPr>
             <a:spLocks noGrp="1"/>
           </p:cNvSpPr>
@@ -651,11 +630,6 @@
         <p:spPr/>
       </p:sp>
     </p:spTree>
-    <p:extLst>
-      <p:ext uri="{BB962C8B-B14F-4D97-AF65-F5344CB8AC3E}">
-        <p14:creationId xmlns:p14="http://schemas.microsoft.com/office/powerpoint/2010/main" val="2974063214"/>
-      </p:ext>
-    </p:extLst>
   </p:cSld>
   <p:clrMapOvr>
     <a:masterClrMapping/>
@@ -709,7 +683,7 @@
           <a:p>
             <a:r>
               <a:rPr dirty="0"/>
-              <a:t>Patterns like Strategy and Observer become much clearer when interfaces are visible and not hidden behind concrete implementations.</a:t>
+              <a:t>Ask students to consider: does this class really need to own this dependency, or does it only need it temporarily?</a:t>
             </a:r>
           </a:p>
         </p:txBody>
@@ -780,7 +754,7 @@
           <a:p>
             <a:r>
               <a:rPr dirty="0"/>
-              <a:t>Stress that good diagrams are selective. You diagram what matters for the decision you are discussing, not everything that exists.</a:t>
+              <a:t>Patterns like Strategy and Observer become much clearer when interfaces are visible and not hidden behind concrete implementations.</a:t>
             </a:r>
           </a:p>
         </p:txBody>
@@ -851,7 +825,7 @@
           <a:p>
             <a:r>
               <a:rPr dirty="0"/>
-              <a:t>Reading code is serial and slow. Diagrams allow parallel understanding and quicker agreement or disagreement during reviews.</a:t>
+              <a:t>Stress that good diagrams are selective. You diagram what matters for the decision you are discussing, not everything that exists.</a:t>
             </a:r>
           </a:p>
         </p:txBody>
@@ -922,7 +896,7 @@
           <a:p>
             <a:r>
               <a:rPr dirty="0"/>
-              <a:t>Talk about using diagrams in PRs or design reviews to explain why something is built a certain way instead of arguing line-by-line in code.</a:t>
+              <a:t>Reading code is serial and slow. Diagrams allow parallel understanding and quicker agreement or disagreement during reviews.</a:t>
             </a:r>
           </a:p>
         </p:txBody>
@@ -993,7 +967,7 @@
           <a:p>
             <a:r>
               <a:rPr dirty="0"/>
-              <a:t>Each class box invites questions. Too many relationships often indicate too many responsibilities.</a:t>
+              <a:t>Talk about using diagrams in PRs or design reviews to explain why something is built a certain way instead of arguing line-by-line in code.</a:t>
             </a:r>
           </a:p>
         </p:txBody>
@@ -1019,6 +993,77 @@
 </file>
 
 <file path=ppt/notesSlides/notesSlide16.xml><?xml version="1.0" encoding="utf-8"?>
+<p:notes xmlns:a="http://schemas.openxmlformats.org/drawingml/2006/main" xmlns:r="http://schemas.openxmlformats.org/officeDocument/2006/relationships" xmlns:p="http://schemas.openxmlformats.org/presentationml/2006/main">
+  <p:cSld>
+    <p:spTree>
+      <p:nvGrpSpPr>
+        <p:cNvPr id="1" name=""/>
+        <p:cNvGrpSpPr/>
+        <p:nvPr/>
+      </p:nvGrpSpPr>
+      <p:grpSpPr>
+        <a:xfrm>
+          <a:off x="0" y="0"/>
+          <a:ext cx="0" cy="0"/>
+          <a:chOff x="0" y="0"/>
+          <a:chExt cx="0" cy="0"/>
+        </a:xfrm>
+      </p:grpSpPr>
+      <p:sp>
+        <p:nvSpPr>
+          <p:cNvPr id="2" name="Slide Image Placeholder 1"/>
+          <p:cNvSpPr>
+            <a:spLocks noGrp="1" noRot="1" noChangeAspect="1"/>
+          </p:cNvSpPr>
+          <p:nvPr>
+            <p:ph type="sldImg" idx="2"/>
+          </p:nvPr>
+        </p:nvSpPr>
+        <p:spPr/>
+      </p:sp>
+      <p:sp>
+        <p:nvSpPr>
+          <p:cNvPr id="3" name="Notes Placeholder 2"/>
+          <p:cNvSpPr>
+            <a:spLocks noGrp="1"/>
+          </p:cNvSpPr>
+          <p:nvPr>
+            <p:ph type="body" sz="quarter" idx="3"/>
+          </p:nvPr>
+        </p:nvSpPr>
+        <p:spPr/>
+        <p:txBody>
+          <a:bodyPr/>
+          <a:lstStyle/>
+          <a:p>
+            <a:r>
+              <a:rPr dirty="0"/>
+              <a:t>Each class box invites questions. Too many relationships often indicate too many responsibilities.</a:t>
+            </a:r>
+          </a:p>
+        </p:txBody>
+      </p:sp>
+      <p:sp>
+        <p:nvSpPr>
+          <p:cNvPr id="4" name="Slide Number Placeholder 3"/>
+          <p:cNvSpPr>
+            <a:spLocks noGrp="1"/>
+          </p:cNvSpPr>
+          <p:nvPr>
+            <p:ph type="sldNum" sz="quarter" idx="5"/>
+          </p:nvPr>
+        </p:nvSpPr>
+        <p:spPr/>
+      </p:sp>
+    </p:spTree>
+  </p:cSld>
+  <p:clrMapOvr>
+    <a:masterClrMapping/>
+  </p:clrMapOvr>
+</p:notes>
+</file>
+
+<file path=ppt/notesSlides/notesSlide17.xml><?xml version="1.0" encoding="utf-8"?>
 <p:notes xmlns:a="http://schemas.openxmlformats.org/drawingml/2006/main" xmlns:r="http://schemas.openxmlformats.org/officeDocument/2006/relationships" xmlns:p="http://schemas.openxmlformats.org/presentationml/2006/main">
   <p:cSld>
     <p:spTree>
@@ -1118,7 +1163,7 @@
 </p:notes>
 </file>
 
-<file path=ppt/notesSlides/notesSlide17.xml><?xml version="1.0" encoding="utf-8"?>
+<file path=ppt/notesSlides/notesSlide18.xml><?xml version="1.0" encoding="utf-8"?>
 <p:notes xmlns:a="http://schemas.openxmlformats.org/drawingml/2006/main" xmlns:r="http://schemas.openxmlformats.org/officeDocument/2006/relationships" xmlns:p="http://schemas.openxmlformats.org/presentationml/2006/main">
   <p:cSld>
     <p:spTree>
@@ -1218,7 +1263,7 @@
 </p:notes>
 </file>
 
-<file path=ppt/notesSlides/notesSlide18.xml><?xml version="1.0" encoding="utf-8"?>
+<file path=ppt/notesSlides/notesSlide19.xml><?xml version="1.0" encoding="utf-8"?>
 <p:notes xmlns:a="http://schemas.openxmlformats.org/drawingml/2006/main" xmlns:r="http://schemas.openxmlformats.org/officeDocument/2006/relationships" xmlns:p="http://schemas.openxmlformats.org/presentationml/2006/main">
   <p:cSld>
     <p:spTree>
@@ -1282,106 +1327,6 @@
         <p:spPr/>
       </p:sp>
     </p:spTree>
-  </p:cSld>
-  <p:clrMapOvr>
-    <a:masterClrMapping/>
-  </p:clrMapOvr>
-</p:notes>
-</file>
-
-<file path=ppt/notesSlides/notesSlide19.xml><?xml version="1.0" encoding="utf-8"?>
-<p:notes xmlns:a="http://schemas.openxmlformats.org/drawingml/2006/main" xmlns:r="http://schemas.openxmlformats.org/officeDocument/2006/relationships" xmlns:p="http://schemas.openxmlformats.org/presentationml/2006/main">
-  <p:cSld>
-    <p:spTree>
-      <p:nvGrpSpPr>
-        <p:cNvPr id="1" name="">
-          <a:extLst>
-            <a:ext uri="{FF2B5EF4-FFF2-40B4-BE49-F238E27FC236}">
-              <a16:creationId xmlns:a16="http://schemas.microsoft.com/office/drawing/2014/main" id="{2879308E-4A43-948B-725F-9C18B55A2633}"/>
-            </a:ext>
-          </a:extLst>
-        </p:cNvPr>
-        <p:cNvGrpSpPr/>
-        <p:nvPr/>
-      </p:nvGrpSpPr>
-      <p:grpSpPr>
-        <a:xfrm>
-          <a:off x="0" y="0"/>
-          <a:ext cx="0" cy="0"/>
-          <a:chOff x="0" y="0"/>
-          <a:chExt cx="0" cy="0"/>
-        </a:xfrm>
-      </p:grpSpPr>
-      <p:sp>
-        <p:nvSpPr>
-          <p:cNvPr id="2" name="Slide Image Placeholder 1">
-            <a:extLst>
-              <a:ext uri="{FF2B5EF4-FFF2-40B4-BE49-F238E27FC236}">
-                <a16:creationId xmlns:a16="http://schemas.microsoft.com/office/drawing/2014/main" id="{47340ABD-54B5-A3F7-15BB-0420DBCB74CF}"/>
-              </a:ext>
-            </a:extLst>
-          </p:cNvPr>
-          <p:cNvSpPr>
-            <a:spLocks noGrp="1" noRot="1" noChangeAspect="1"/>
-          </p:cNvSpPr>
-          <p:nvPr>
-            <p:ph type="sldImg" idx="2"/>
-          </p:nvPr>
-        </p:nvSpPr>
-        <p:spPr/>
-      </p:sp>
-      <p:sp>
-        <p:nvSpPr>
-          <p:cNvPr id="3" name="Notes Placeholder 2">
-            <a:extLst>
-              <a:ext uri="{FF2B5EF4-FFF2-40B4-BE49-F238E27FC236}">
-                <a16:creationId xmlns:a16="http://schemas.microsoft.com/office/drawing/2014/main" id="{78344995-0E3A-736C-F4E3-54BFEF9D341C}"/>
-              </a:ext>
-            </a:extLst>
-          </p:cNvPr>
-          <p:cNvSpPr>
-            <a:spLocks noGrp="1"/>
-          </p:cNvSpPr>
-          <p:nvPr>
-            <p:ph type="body" sz="quarter" idx="3"/>
-          </p:nvPr>
-        </p:nvSpPr>
-        <p:spPr/>
-        <p:txBody>
-          <a:bodyPr/>
-          <a:lstStyle/>
-          <a:p>
-            <a:r>
-              <a:rPr dirty="0"/>
-              <a:t>Whiteboard or diagram tools allow experimentation without refactoring code. This encourages exploration instead of premature commitment.</a:t>
-            </a:r>
-          </a:p>
-        </p:txBody>
-      </p:sp>
-      <p:sp>
-        <p:nvSpPr>
-          <p:cNvPr id="4" name="Slide Number Placeholder 3">
-            <a:extLst>
-              <a:ext uri="{FF2B5EF4-FFF2-40B4-BE49-F238E27FC236}">
-                <a16:creationId xmlns:a16="http://schemas.microsoft.com/office/drawing/2014/main" id="{8C809F67-C529-D2F7-A5EC-8AF654EAE5BD}"/>
-              </a:ext>
-            </a:extLst>
-          </p:cNvPr>
-          <p:cNvSpPr>
-            <a:spLocks noGrp="1"/>
-          </p:cNvSpPr>
-          <p:nvPr>
-            <p:ph type="sldNum" sz="quarter" idx="5"/>
-          </p:nvPr>
-        </p:nvSpPr>
-        <p:spPr/>
-      </p:sp>
-    </p:spTree>
-    <p:extLst>
-      <p:ext uri="{BB962C8B-B14F-4D97-AF65-F5344CB8AC3E}">
-        <p14:creationId xmlns:p14="http://schemas.microsoft.com/office/powerpoint/2010/main" val="951704840"/>
-      </p:ext>
-    </p:extLst>
   </p:cSld>
   <p:clrMapOvr>
     <a:masterClrMapping/>
@@ -1465,6 +1410,106 @@
   <p:cSld>
     <p:spTree>
       <p:nvGrpSpPr>
+        <p:cNvPr id="1" name="">
+          <a:extLst>
+            <a:ext uri="{FF2B5EF4-FFF2-40B4-BE49-F238E27FC236}">
+              <a16:creationId xmlns:a16="http://schemas.microsoft.com/office/drawing/2014/main" id="{2879308E-4A43-948B-725F-9C18B55A2633}"/>
+            </a:ext>
+          </a:extLst>
+        </p:cNvPr>
+        <p:cNvGrpSpPr/>
+        <p:nvPr/>
+      </p:nvGrpSpPr>
+      <p:grpSpPr>
+        <a:xfrm>
+          <a:off x="0" y="0"/>
+          <a:ext cx="0" cy="0"/>
+          <a:chOff x="0" y="0"/>
+          <a:chExt cx="0" cy="0"/>
+        </a:xfrm>
+      </p:grpSpPr>
+      <p:sp>
+        <p:nvSpPr>
+          <p:cNvPr id="2" name="Slide Image Placeholder 1">
+            <a:extLst>
+              <a:ext uri="{FF2B5EF4-FFF2-40B4-BE49-F238E27FC236}">
+                <a16:creationId xmlns:a16="http://schemas.microsoft.com/office/drawing/2014/main" id="{47340ABD-54B5-A3F7-15BB-0420DBCB74CF}"/>
+              </a:ext>
+            </a:extLst>
+          </p:cNvPr>
+          <p:cNvSpPr>
+            <a:spLocks noGrp="1" noRot="1" noChangeAspect="1"/>
+          </p:cNvSpPr>
+          <p:nvPr>
+            <p:ph type="sldImg" idx="2"/>
+          </p:nvPr>
+        </p:nvSpPr>
+        <p:spPr/>
+      </p:sp>
+      <p:sp>
+        <p:nvSpPr>
+          <p:cNvPr id="3" name="Notes Placeholder 2">
+            <a:extLst>
+              <a:ext uri="{FF2B5EF4-FFF2-40B4-BE49-F238E27FC236}">
+                <a16:creationId xmlns:a16="http://schemas.microsoft.com/office/drawing/2014/main" id="{78344995-0E3A-736C-F4E3-54BFEF9D341C}"/>
+              </a:ext>
+            </a:extLst>
+          </p:cNvPr>
+          <p:cNvSpPr>
+            <a:spLocks noGrp="1"/>
+          </p:cNvSpPr>
+          <p:nvPr>
+            <p:ph type="body" sz="quarter" idx="3"/>
+          </p:nvPr>
+        </p:nvSpPr>
+        <p:spPr/>
+        <p:txBody>
+          <a:bodyPr/>
+          <a:lstStyle/>
+          <a:p>
+            <a:r>
+              <a:rPr dirty="0"/>
+              <a:t>Whiteboard or diagram tools allow experimentation without refactoring code. This encourages exploration instead of premature commitment.</a:t>
+            </a:r>
+          </a:p>
+        </p:txBody>
+      </p:sp>
+      <p:sp>
+        <p:nvSpPr>
+          <p:cNvPr id="4" name="Slide Number Placeholder 3">
+            <a:extLst>
+              <a:ext uri="{FF2B5EF4-FFF2-40B4-BE49-F238E27FC236}">
+                <a16:creationId xmlns:a16="http://schemas.microsoft.com/office/drawing/2014/main" id="{8C809F67-C529-D2F7-A5EC-8AF654EAE5BD}"/>
+              </a:ext>
+            </a:extLst>
+          </p:cNvPr>
+          <p:cNvSpPr>
+            <a:spLocks noGrp="1"/>
+          </p:cNvSpPr>
+          <p:nvPr>
+            <p:ph type="sldNum" sz="quarter" idx="5"/>
+          </p:nvPr>
+        </p:nvSpPr>
+        <p:spPr/>
+      </p:sp>
+    </p:spTree>
+    <p:extLst>
+      <p:ext uri="{BB962C8B-B14F-4D97-AF65-F5344CB8AC3E}">
+        <p14:creationId xmlns:p14="http://schemas.microsoft.com/office/powerpoint/2010/main" val="951704840"/>
+      </p:ext>
+    </p:extLst>
+  </p:cSld>
+  <p:clrMapOvr>
+    <a:masterClrMapping/>
+  </p:clrMapOvr>
+</p:notes>
+</file>
+
+<file path=ppt/notesSlides/notesSlide21.xml><?xml version="1.0" encoding="utf-8"?>
+<p:notes xmlns:a="http://schemas.openxmlformats.org/drawingml/2006/main" xmlns:r="http://schemas.openxmlformats.org/officeDocument/2006/relationships" xmlns:p="http://schemas.openxmlformats.org/presentationml/2006/main">
+  <p:cSld>
+    <p:spTree>
+      <p:nvGrpSpPr>
         <p:cNvPr id="1" name=""/>
         <p:cNvGrpSpPr/>
         <p:nvPr/>
@@ -1531,7 +1576,7 @@
 </p:notes>
 </file>
 
-<file path=ppt/notesSlides/notesSlide21.xml><?xml version="1.0" encoding="utf-8"?>
+<file path=ppt/notesSlides/notesSlide22.xml><?xml version="1.0" encoding="utf-8"?>
 <p:notes xmlns:a="http://schemas.openxmlformats.org/drawingml/2006/main" xmlns:r="http://schemas.openxmlformats.org/officeDocument/2006/relationships" xmlns:p="http://schemas.openxmlformats.org/presentationml/2006/main">
   <p:cSld>
     <p:spTree>
@@ -1752,7 +1797,7 @@
 </p:notes>
 </file>
 
-<file path=ppt/notesSlides/notesSlide22.xml><?xml version="1.0" encoding="utf-8"?>
+<file path=ppt/notesSlides/notesSlide23.xml><?xml version="1.0" encoding="utf-8"?>
 <p:notes xmlns:a="http://schemas.openxmlformats.org/drawingml/2006/main" xmlns:r="http://schemas.openxmlformats.org/officeDocument/2006/relationships" xmlns:p="http://schemas.openxmlformats.org/presentationml/2006/main">
   <p:cSld>
     <p:spTree>
@@ -2082,7 +2127,7 @@
           <a:p>
             <a:r>
               <a:rPr dirty="0"/>
-              <a:t>Dense or tangled structures are easier to spot in diagrams than in code. This is often where students first notice over-coupling or god classes.</a:t>
+              <a:t>Reinforce OO principles here. Interfaces describe capability without commitment. Diagrams make this distinction obvious and visible.</a:t>
             </a:r>
           </a:p>
         </p:txBody>
@@ -2112,7 +2157,13 @@
   <p:cSld>
     <p:spTree>
       <p:nvGrpSpPr>
-        <p:cNvPr id="1" name=""/>
+        <p:cNvPr id="1" name="">
+          <a:extLst>
+            <a:ext uri="{FF2B5EF4-FFF2-40B4-BE49-F238E27FC236}">
+              <a16:creationId xmlns:a16="http://schemas.microsoft.com/office/drawing/2014/main" id="{D6630A00-76B5-07BF-E2D8-9B6572ECF8FE}"/>
+            </a:ext>
+          </a:extLst>
+        </p:cNvPr>
         <p:cNvGrpSpPr/>
         <p:nvPr/>
       </p:nvGrpSpPr>
@@ -2126,7 +2177,13 @@
       </p:grpSpPr>
       <p:sp>
         <p:nvSpPr>
-          <p:cNvPr id="2" name="Slide Image Placeholder 1"/>
+          <p:cNvPr id="2" name="Slide Image Placeholder 1">
+            <a:extLst>
+              <a:ext uri="{FF2B5EF4-FFF2-40B4-BE49-F238E27FC236}">
+                <a16:creationId xmlns:a16="http://schemas.microsoft.com/office/drawing/2014/main" id="{57C80496-6A01-0C63-109B-9701C726B706}"/>
+              </a:ext>
+            </a:extLst>
+          </p:cNvPr>
           <p:cNvSpPr>
             <a:spLocks noGrp="1" noRot="1" noChangeAspect="1"/>
           </p:cNvSpPr>
@@ -2138,7 +2195,13 @@
       </p:sp>
       <p:sp>
         <p:nvSpPr>
-          <p:cNvPr id="3" name="Notes Placeholder 2"/>
+          <p:cNvPr id="3" name="Notes Placeholder 2">
+            <a:extLst>
+              <a:ext uri="{FF2B5EF4-FFF2-40B4-BE49-F238E27FC236}">
+                <a16:creationId xmlns:a16="http://schemas.microsoft.com/office/drawing/2014/main" id="{D749104B-2CC7-8993-882F-19AB3F074B97}"/>
+              </a:ext>
+            </a:extLst>
+          </p:cNvPr>
           <p:cNvSpPr>
             <a:spLocks noGrp="1"/>
           </p:cNvSpPr>
@@ -2153,14 +2216,20 @@
           <a:p>
             <a:r>
               <a:rPr dirty="0"/>
-              <a:t>Clarify that not all dependencies should be fields. UML dependency arrows help distinguish temporary usage from structural ownership.</a:t>
-            </a:r>
-          </a:p>
-        </p:txBody>
-      </p:sp>
-      <p:sp>
-        <p:nvSpPr>
-          <p:cNvPr id="4" name="Slide Number Placeholder 3"/>
+              <a:t>Reinforce OO principles here. Interfaces describe capability without commitment. Diagrams make this distinction obvious and visible.</a:t>
+            </a:r>
+          </a:p>
+        </p:txBody>
+      </p:sp>
+      <p:sp>
+        <p:nvSpPr>
+          <p:cNvPr id="4" name="Slide Number Placeholder 3">
+            <a:extLst>
+              <a:ext uri="{FF2B5EF4-FFF2-40B4-BE49-F238E27FC236}">
+                <a16:creationId xmlns:a16="http://schemas.microsoft.com/office/drawing/2014/main" id="{985780CD-101D-FE75-CD92-3F3CF24AD242}"/>
+              </a:ext>
+            </a:extLst>
+          </p:cNvPr>
           <p:cNvSpPr>
             <a:spLocks noGrp="1"/>
           </p:cNvSpPr>
@@ -2171,6 +2240,11 @@
         <p:spPr/>
       </p:sp>
     </p:spTree>
+    <p:extLst>
+      <p:ext uri="{BB962C8B-B14F-4D97-AF65-F5344CB8AC3E}">
+        <p14:creationId xmlns:p14="http://schemas.microsoft.com/office/powerpoint/2010/main" val="2974063214"/>
+      </p:ext>
+    </p:extLst>
   </p:cSld>
   <p:clrMapOvr>
     <a:masterClrMapping/>
@@ -2224,7 +2298,7 @@
           <a:p>
             <a:r>
               <a:rPr dirty="0"/>
-              <a:t>Ask students to consider: does this class really need to own this dependency, or does it only need it temporarily?</a:t>
+              <a:t>Clarify that not all dependencies should be fields. UML dependency arrows help distinguish temporary usage from structural ownership.</a:t>
             </a:r>
           </a:p>
         </p:txBody>
@@ -2254,7 +2328,13 @@
   <p:cSld>
     <p:spTree>
       <p:nvGrpSpPr>
-        <p:cNvPr id="1" name=""/>
+        <p:cNvPr id="1" name="">
+          <a:extLst>
+            <a:ext uri="{FF2B5EF4-FFF2-40B4-BE49-F238E27FC236}">
+              <a16:creationId xmlns:a16="http://schemas.microsoft.com/office/drawing/2014/main" id="{BA0E1D52-7D5D-D145-E834-E7F764A8726B}"/>
+            </a:ext>
+          </a:extLst>
+        </p:cNvPr>
         <p:cNvGrpSpPr/>
         <p:nvPr/>
       </p:nvGrpSpPr>
@@ -2268,7 +2348,13 @@
       </p:grpSpPr>
       <p:sp>
         <p:nvSpPr>
-          <p:cNvPr id="2" name="Slide Image Placeholder 1"/>
+          <p:cNvPr id="2" name="Slide Image Placeholder 1">
+            <a:extLst>
+              <a:ext uri="{FF2B5EF4-FFF2-40B4-BE49-F238E27FC236}">
+                <a16:creationId xmlns:a16="http://schemas.microsoft.com/office/drawing/2014/main" id="{E9E4D9E3-8F32-85B9-E2C7-DB8B96B2C5B7}"/>
+              </a:ext>
+            </a:extLst>
+          </p:cNvPr>
           <p:cNvSpPr>
             <a:spLocks noGrp="1" noRot="1" noChangeAspect="1"/>
           </p:cNvSpPr>
@@ -2280,7 +2366,13 @@
       </p:sp>
       <p:sp>
         <p:nvSpPr>
-          <p:cNvPr id="3" name="Notes Placeholder 2"/>
+          <p:cNvPr id="3" name="Notes Placeholder 2">
+            <a:extLst>
+              <a:ext uri="{FF2B5EF4-FFF2-40B4-BE49-F238E27FC236}">
+                <a16:creationId xmlns:a16="http://schemas.microsoft.com/office/drawing/2014/main" id="{79F2CDF9-6E79-023A-5718-AAEFC273B70C}"/>
+              </a:ext>
+            </a:extLst>
+          </p:cNvPr>
           <p:cNvSpPr>
             <a:spLocks noGrp="1"/>
           </p:cNvSpPr>
@@ -2295,14 +2387,20 @@
           <a:p>
             <a:r>
               <a:rPr dirty="0"/>
-              <a:t>Reinforce OO principles here. Interfaces describe capability without commitment. Diagrams make this distinction obvious and visible.</a:t>
-            </a:r>
-          </a:p>
-        </p:txBody>
-      </p:sp>
-      <p:sp>
-        <p:nvSpPr>
-          <p:cNvPr id="4" name="Slide Number Placeholder 3"/>
+              <a:t>Clarify that not all dependencies should be fields. UML dependency arrows help distinguish temporary usage from structural ownership.</a:t>
+            </a:r>
+          </a:p>
+        </p:txBody>
+      </p:sp>
+      <p:sp>
+        <p:nvSpPr>
+          <p:cNvPr id="4" name="Slide Number Placeholder 3">
+            <a:extLst>
+              <a:ext uri="{FF2B5EF4-FFF2-40B4-BE49-F238E27FC236}">
+                <a16:creationId xmlns:a16="http://schemas.microsoft.com/office/drawing/2014/main" id="{FD39FC74-6974-024A-C799-A9D600ADEE75}"/>
+              </a:ext>
+            </a:extLst>
+          </p:cNvPr>
           <p:cNvSpPr>
             <a:spLocks noGrp="1"/>
           </p:cNvSpPr>
@@ -2313,6 +2411,11 @@
         <p:spPr/>
       </p:sp>
     </p:spTree>
+    <p:extLst>
+      <p:ext uri="{BB962C8B-B14F-4D97-AF65-F5344CB8AC3E}">
+        <p14:creationId xmlns:p14="http://schemas.microsoft.com/office/powerpoint/2010/main" val="55608875"/>
+      </p:ext>
+    </p:extLst>
   </p:cSld>
   <p:clrMapOvr>
     <a:masterClrMapping/>
@@ -6839,7 +6942,13 @@
   <p:cSld>
     <p:spTree>
       <p:nvGrpSpPr>
-        <p:cNvPr id="1" name=""/>
+        <p:cNvPr id="1" name="">
+          <a:extLst>
+            <a:ext uri="{FF2B5EF4-FFF2-40B4-BE49-F238E27FC236}">
+              <a16:creationId xmlns:a16="http://schemas.microsoft.com/office/drawing/2014/main" id="{7F3E559C-5CD0-38A8-40C3-91754E01870F}"/>
+            </a:ext>
+          </a:extLst>
+        </p:cNvPr>
         <p:cNvGrpSpPr/>
         <p:nvPr/>
       </p:nvGrpSpPr>
@@ -6853,7 +6962,13 @@
       </p:grpSpPr>
       <p:sp>
         <p:nvSpPr>
-          <p:cNvPr id="2" name="Title 1"/>
+          <p:cNvPr id="2" name="Title 1">
+            <a:extLst>
+              <a:ext uri="{FF2B5EF4-FFF2-40B4-BE49-F238E27FC236}">
+                <a16:creationId xmlns:a16="http://schemas.microsoft.com/office/drawing/2014/main" id="{D2DBD7A8-2DEF-3EE2-17C8-845DCB13DA80}"/>
+              </a:ext>
+            </a:extLst>
+          </p:cNvPr>
           <p:cNvSpPr>
             <a:spLocks noGrp="1"/>
           </p:cNvSpPr>
@@ -6861,73 +6976,58 @@
             <p:ph type="title"/>
           </p:nvPr>
         </p:nvSpPr>
-        <p:spPr/>
-        <p:txBody>
-          <a:bodyPr/>
-          <a:lstStyle/>
-          <a:p>
-            <a:r>
-              <a:rPr dirty="0"/>
-              <a:t>Temporal / Usage Dependencies</a:t>
-            </a:r>
-          </a:p>
-        </p:txBody>
-      </p:sp>
-      <p:sp>
-        <p:nvSpPr>
-          <p:cNvPr id="3" name="Content Placeholder 2"/>
-          <p:cNvSpPr>
-            <a:spLocks noGrp="1"/>
-          </p:cNvSpPr>
-          <p:nvPr>
-            <p:ph idx="1"/>
-          </p:nvPr>
-        </p:nvSpPr>
-        <p:spPr/>
-        <p:txBody>
-          <a:bodyPr/>
-          <a:lstStyle/>
-          <a:p>
-            <a:pPr marL="0" indent="0">
-              <a:buNone/>
-            </a:pPr>
+        <p:spPr>
+          <a:xfrm>
+            <a:off x="1767016" y="808056"/>
+            <a:ext cx="8803123" cy="1077229"/>
+          </a:xfrm>
+        </p:spPr>
+        <p:txBody>
+          <a:bodyPr/>
+          <a:lstStyle/>
+          <a:p>
             <a:r>
               <a:rPr lang="en-US" dirty="0"/>
-              <a:t>Not all dependencies should be fields. </a:t>
-            </a:r>
-          </a:p>
-          <a:p>
-            <a:pPr marL="0" indent="0">
-              <a:buNone/>
-            </a:pPr>
-            <a:r>
-              <a:rPr lang="en-US" dirty="0"/>
-              <a:t>UML dependency arrows help distinguish temporary usage from structural ownership.</a:t>
-            </a:r>
-          </a:p>
-          <a:p>
-            <a:r>
-              <a:rPr dirty="0"/>
-              <a:t>Method parameters</a:t>
-            </a:r>
-          </a:p>
-          <a:p>
-            <a:pPr lvl="1"/>
-            <a:r>
-              <a:rPr dirty="0"/>
-              <a:t>Local variables</a:t>
-            </a:r>
-          </a:p>
-          <a:p>
-            <a:pPr lvl="1"/>
-            <a:r>
-              <a:rPr dirty="0"/>
-              <a:t>Short-lived interactions</a:t>
-            </a:r>
-          </a:p>
-        </p:txBody>
-      </p:sp>
+              <a:t>Interface Realization / Type-Level Structural</a:t>
+            </a:r>
+          </a:p>
+        </p:txBody>
+      </p:sp>
+      <p:pic>
+        <p:nvPicPr>
+          <p:cNvPr id="4" name="Picture 3">
+            <a:extLst>
+              <a:ext uri="{FF2B5EF4-FFF2-40B4-BE49-F238E27FC236}">
+                <a16:creationId xmlns:a16="http://schemas.microsoft.com/office/drawing/2014/main" id="{040E566C-E63A-F3E5-4565-9D91F05314DF}"/>
+              </a:ext>
+            </a:extLst>
+          </p:cNvPr>
+          <p:cNvPicPr>
+            <a:picLocks noChangeAspect="1"/>
+          </p:cNvPicPr>
+          <p:nvPr/>
+        </p:nvPicPr>
+        <p:blipFill>
+          <a:blip r:embed="rId2"/>
+          <a:srcRect/>
+          <a:stretch/>
+        </p:blipFill>
+        <p:spPr>
+          <a:xfrm>
+            <a:off x="1459142" y="1717373"/>
+            <a:ext cx="9501095" cy="3769027"/>
+          </a:xfrm>
+          <a:prstGeom prst="rect">
+            <a:avLst/>
+          </a:prstGeom>
+        </p:spPr>
+      </p:pic>
     </p:spTree>
+    <p:extLst>
+      <p:ext uri="{BB962C8B-B14F-4D97-AF65-F5344CB8AC3E}">
+        <p14:creationId xmlns:p14="http://schemas.microsoft.com/office/powerpoint/2010/main" val="3330628743"/>
+      </p:ext>
+    </p:extLst>
   </p:cSld>
   <p:clrMapOvr>
     <a:masterClrMapping/>
@@ -6954,6 +7054,310 @@
       </p:grpSpPr>
       <p:sp>
         <p:nvSpPr>
+          <p:cNvPr id="2" name="Title 1"/>
+          <p:cNvSpPr>
+            <a:spLocks noGrp="1"/>
+          </p:cNvSpPr>
+          <p:nvPr>
+            <p:ph type="title"/>
+          </p:nvPr>
+        </p:nvSpPr>
+        <p:spPr/>
+        <p:txBody>
+          <a:bodyPr/>
+          <a:lstStyle/>
+          <a:p>
+            <a:r>
+              <a:rPr dirty="0"/>
+              <a:t>Interfaces vs Concrete Dependencies</a:t>
+            </a:r>
+          </a:p>
+        </p:txBody>
+      </p:sp>
+      <p:sp>
+        <p:nvSpPr>
+          <p:cNvPr id="3" name="Content Placeholder 2"/>
+          <p:cNvSpPr>
+            <a:spLocks noGrp="1"/>
+          </p:cNvSpPr>
+          <p:nvPr>
+            <p:ph idx="1"/>
+          </p:nvPr>
+        </p:nvSpPr>
+        <p:spPr/>
+        <p:txBody>
+          <a:bodyPr/>
+          <a:lstStyle/>
+          <a:p>
+            <a:pPr marL="0" indent="0">
+              <a:buNone/>
+            </a:pPr>
+            <a:r>
+              <a:rPr lang="en-US" dirty="0"/>
+              <a:t>Interfaces describe capability </a:t>
+            </a:r>
+            <a:r>
+              <a:rPr lang="en-US" i="1" dirty="0"/>
+              <a:t>without commitment</a:t>
+            </a:r>
+            <a:r>
+              <a:rPr lang="en-US" dirty="0"/>
+              <a:t>. </a:t>
+            </a:r>
+          </a:p>
+          <a:p>
+            <a:pPr marL="0" indent="0">
+              <a:buNone/>
+            </a:pPr>
+            <a:r>
+              <a:rPr lang="en-US" dirty="0"/>
+              <a:t>Diagrams make this distinction obvious and visible.</a:t>
+            </a:r>
+          </a:p>
+          <a:p>
+            <a:r>
+              <a:rPr dirty="0"/>
+              <a:t>Interfaces express contracts</a:t>
+            </a:r>
+          </a:p>
+          <a:p>
+            <a:pPr lvl="1"/>
+            <a:r>
+              <a:rPr dirty="0"/>
+              <a:t>Concrete classes express decisions</a:t>
+            </a:r>
+          </a:p>
+          <a:p>
+            <a:pPr lvl="1"/>
+            <a:r>
+              <a:rPr dirty="0"/>
+              <a:t>Prefer depending on abstractions</a:t>
+            </a:r>
+          </a:p>
+        </p:txBody>
+      </p:sp>
+    </p:spTree>
+  </p:cSld>
+  <p:clrMapOvr>
+    <a:masterClrMapping/>
+  </p:clrMapOvr>
+</p:sld>
+</file>
+
+<file path=ppt/slides/slide12.xml><?xml version="1.0" encoding="utf-8"?>
+<p:sld xmlns:a="http://schemas.openxmlformats.org/drawingml/2006/main" xmlns:r="http://schemas.openxmlformats.org/officeDocument/2006/relationships" xmlns:p="http://schemas.openxmlformats.org/presentationml/2006/main">
+  <p:cSld>
+    <p:spTree>
+      <p:nvGrpSpPr>
+        <p:cNvPr id="1" name="">
+          <a:extLst>
+            <a:ext uri="{FF2B5EF4-FFF2-40B4-BE49-F238E27FC236}">
+              <a16:creationId xmlns:a16="http://schemas.microsoft.com/office/drawing/2014/main" id="{6513E7AA-B9D1-AB8F-198E-EA01AF5C0F1D}"/>
+            </a:ext>
+          </a:extLst>
+        </p:cNvPr>
+        <p:cNvGrpSpPr/>
+        <p:nvPr/>
+      </p:nvGrpSpPr>
+      <p:grpSpPr>
+        <a:xfrm>
+          <a:off x="0" y="0"/>
+          <a:ext cx="0" cy="0"/>
+          <a:chOff x="0" y="0"/>
+          <a:chExt cx="0" cy="0"/>
+        </a:xfrm>
+      </p:grpSpPr>
+      <p:sp>
+        <p:nvSpPr>
+          <p:cNvPr id="2" name="Title 1">
+            <a:extLst>
+              <a:ext uri="{FF2B5EF4-FFF2-40B4-BE49-F238E27FC236}">
+                <a16:creationId xmlns:a16="http://schemas.microsoft.com/office/drawing/2014/main" id="{66EBDCB7-F2F1-8C4D-B372-D0FB620163A2}"/>
+              </a:ext>
+            </a:extLst>
+          </p:cNvPr>
+          <p:cNvSpPr>
+            <a:spLocks noGrp="1"/>
+          </p:cNvSpPr>
+          <p:nvPr>
+            <p:ph type="title"/>
+          </p:nvPr>
+        </p:nvSpPr>
+        <p:spPr/>
+        <p:txBody>
+          <a:bodyPr/>
+          <a:lstStyle/>
+          <a:p>
+            <a:r>
+              <a:rPr dirty="0"/>
+              <a:t>Interfaces vs Concrete Dependencies</a:t>
+            </a:r>
+          </a:p>
+        </p:txBody>
+      </p:sp>
+      <p:pic>
+        <p:nvPicPr>
+          <p:cNvPr id="7" name="Picture 6">
+            <a:extLst>
+              <a:ext uri="{FF2B5EF4-FFF2-40B4-BE49-F238E27FC236}">
+                <a16:creationId xmlns:a16="http://schemas.microsoft.com/office/drawing/2014/main" id="{A34E9862-DBF3-0864-0B3A-1FD617D36FEB}"/>
+              </a:ext>
+            </a:extLst>
+          </p:cNvPr>
+          <p:cNvPicPr>
+            <a:picLocks noChangeAspect="1"/>
+          </p:cNvPicPr>
+          <p:nvPr/>
+        </p:nvPicPr>
+        <p:blipFill>
+          <a:blip r:embed="rId3"/>
+          <a:stretch>
+            <a:fillRect/>
+          </a:stretch>
+        </p:blipFill>
+        <p:spPr>
+          <a:xfrm>
+            <a:off x="1279301" y="1885285"/>
+            <a:ext cx="9633398" cy="3188813"/>
+          </a:xfrm>
+          <a:prstGeom prst="rect">
+            <a:avLst/>
+          </a:prstGeom>
+        </p:spPr>
+      </p:pic>
+    </p:spTree>
+    <p:extLst>
+      <p:ext uri="{BB962C8B-B14F-4D97-AF65-F5344CB8AC3E}">
+        <p14:creationId xmlns:p14="http://schemas.microsoft.com/office/powerpoint/2010/main" val="3879621403"/>
+      </p:ext>
+    </p:extLst>
+  </p:cSld>
+  <p:clrMapOvr>
+    <a:masterClrMapping/>
+  </p:clrMapOvr>
+</p:sld>
+</file>
+
+<file path=ppt/slides/slide13.xml><?xml version="1.0" encoding="utf-8"?>
+<p:sld xmlns:a="http://schemas.openxmlformats.org/drawingml/2006/main" xmlns:r="http://schemas.openxmlformats.org/officeDocument/2006/relationships" xmlns:p="http://schemas.openxmlformats.org/presentationml/2006/main">
+  <p:cSld>
+    <p:spTree>
+      <p:nvGrpSpPr>
+        <p:cNvPr id="1" name=""/>
+        <p:cNvGrpSpPr/>
+        <p:nvPr/>
+      </p:nvGrpSpPr>
+      <p:grpSpPr>
+        <a:xfrm>
+          <a:off x="0" y="0"/>
+          <a:ext cx="0" cy="0"/>
+          <a:chOff x="0" y="0"/>
+          <a:chExt cx="0" cy="0"/>
+        </a:xfrm>
+      </p:grpSpPr>
+      <p:sp>
+        <p:nvSpPr>
+          <p:cNvPr id="2" name="Title 1"/>
+          <p:cNvSpPr>
+            <a:spLocks noGrp="1"/>
+          </p:cNvSpPr>
+          <p:nvPr>
+            <p:ph type="title"/>
+          </p:nvPr>
+        </p:nvSpPr>
+        <p:spPr/>
+        <p:txBody>
+          <a:bodyPr/>
+          <a:lstStyle/>
+          <a:p>
+            <a:r>
+              <a:rPr dirty="0"/>
+              <a:t>Temporal Usage Dependencies</a:t>
+            </a:r>
+          </a:p>
+        </p:txBody>
+      </p:sp>
+      <p:sp>
+        <p:nvSpPr>
+          <p:cNvPr id="3" name="Content Placeholder 2"/>
+          <p:cNvSpPr>
+            <a:spLocks noGrp="1"/>
+          </p:cNvSpPr>
+          <p:nvPr>
+            <p:ph idx="1"/>
+          </p:nvPr>
+        </p:nvSpPr>
+        <p:spPr/>
+        <p:txBody>
+          <a:bodyPr/>
+          <a:lstStyle/>
+          <a:p>
+            <a:pPr marL="0" indent="0">
+              <a:buNone/>
+            </a:pPr>
+            <a:r>
+              <a:rPr lang="en-US" dirty="0"/>
+              <a:t>Not all dependencies should be fields. </a:t>
+            </a:r>
+          </a:p>
+          <a:p>
+            <a:pPr marL="0" indent="0">
+              <a:buNone/>
+            </a:pPr>
+            <a:r>
+              <a:rPr lang="en-US" dirty="0"/>
+              <a:t>UML dependency arrows help distinguish temporary usage from structural ownership.</a:t>
+            </a:r>
+          </a:p>
+          <a:p>
+            <a:r>
+              <a:rPr dirty="0"/>
+              <a:t>Method parameters</a:t>
+            </a:r>
+          </a:p>
+          <a:p>
+            <a:pPr lvl="1"/>
+            <a:r>
+              <a:rPr dirty="0"/>
+              <a:t>Local variables</a:t>
+            </a:r>
+          </a:p>
+          <a:p>
+            <a:pPr lvl="1"/>
+            <a:r>
+              <a:rPr dirty="0"/>
+              <a:t>Short-lived interactions</a:t>
+            </a:r>
+          </a:p>
+        </p:txBody>
+      </p:sp>
+    </p:spTree>
+  </p:cSld>
+  <p:clrMapOvr>
+    <a:masterClrMapping/>
+  </p:clrMapOvr>
+</p:sld>
+</file>
+
+<file path=ppt/slides/slide14.xml><?xml version="1.0" encoding="utf-8"?>
+<p:sld xmlns:a="http://schemas.openxmlformats.org/drawingml/2006/main" xmlns:r="http://schemas.openxmlformats.org/officeDocument/2006/relationships" xmlns:p="http://schemas.openxmlformats.org/presentationml/2006/main">
+  <p:cSld>
+    <p:spTree>
+      <p:nvGrpSpPr>
+        <p:cNvPr id="1" name=""/>
+        <p:cNvGrpSpPr/>
+        <p:nvPr/>
+      </p:nvGrpSpPr>
+      <p:grpSpPr>
+        <a:xfrm>
+          <a:off x="0" y="0"/>
+          <a:ext cx="0" cy="0"/>
+          <a:chOff x="0" y="0"/>
+          <a:chExt cx="0" cy="0"/>
+        </a:xfrm>
+      </p:grpSpPr>
+      <p:sp>
+        <p:nvSpPr>
           <p:cNvPr id="2" name="Title 1">
             <a:extLst>
               <a:ext uri="{FF2B5EF4-FFF2-40B4-BE49-F238E27FC236}">
@@ -6975,7 +7379,7 @@
           <a:p>
             <a:r>
               <a:rPr lang="en-US" dirty="0"/>
-              <a:t>Dependency / Temporal</a:t>
+              <a:t>Dependency / Temporal State Structural</a:t>
             </a:r>
           </a:p>
         </p:txBody>
@@ -7023,7 +7427,343 @@
 </p:sld>
 </file>
 
-<file path=ppt/slides/slide12.xml><?xml version="1.0" encoding="utf-8"?>
+<file path=ppt/slides/slide15.xml><?xml version="1.0" encoding="utf-8"?>
+<p:sld xmlns:a="http://schemas.openxmlformats.org/drawingml/2006/main" xmlns:r="http://schemas.openxmlformats.org/officeDocument/2006/relationships" xmlns:p="http://schemas.openxmlformats.org/presentationml/2006/main">
+  <p:cSld>
+    <p:spTree>
+      <p:nvGrpSpPr>
+        <p:cNvPr id="1" name="">
+          <a:extLst>
+            <a:ext uri="{FF2B5EF4-FFF2-40B4-BE49-F238E27FC236}">
+              <a16:creationId xmlns:a16="http://schemas.microsoft.com/office/drawing/2014/main" id="{04E1E110-5897-B54E-503F-584F52AB3B59}"/>
+            </a:ext>
+          </a:extLst>
+        </p:cNvPr>
+        <p:cNvGrpSpPr/>
+        <p:nvPr/>
+      </p:nvGrpSpPr>
+      <p:grpSpPr>
+        <a:xfrm>
+          <a:off x="0" y="0"/>
+          <a:ext cx="0" cy="0"/>
+          <a:chOff x="0" y="0"/>
+          <a:chExt cx="0" cy="0"/>
+        </a:xfrm>
+      </p:grpSpPr>
+      <p:sp>
+        <p:nvSpPr>
+          <p:cNvPr id="2" name="Title 1">
+            <a:extLst>
+              <a:ext uri="{FF2B5EF4-FFF2-40B4-BE49-F238E27FC236}">
+                <a16:creationId xmlns:a16="http://schemas.microsoft.com/office/drawing/2014/main" id="{65F918AB-300F-1F98-4AA5-F22B96819E34}"/>
+              </a:ext>
+            </a:extLst>
+          </p:cNvPr>
+          <p:cNvSpPr>
+            <a:spLocks noGrp="1"/>
+          </p:cNvSpPr>
+          <p:nvPr>
+            <p:ph type="title"/>
+          </p:nvPr>
+        </p:nvSpPr>
+        <p:spPr/>
+        <p:txBody>
+          <a:bodyPr/>
+          <a:lstStyle/>
+          <a:p>
+            <a:r>
+              <a:rPr lang="en-US" dirty="0"/>
+              <a:t>Non-Temporal</a:t>
+            </a:r>
+            <a:r>
+              <a:rPr dirty="0"/>
+              <a:t> </a:t>
+            </a:r>
+            <a:r>
+              <a:rPr lang="en-US" dirty="0"/>
+              <a:t>State </a:t>
+            </a:r>
+            <a:r>
+              <a:rPr dirty="0"/>
+              <a:t>Dependencies</a:t>
+            </a:r>
+          </a:p>
+        </p:txBody>
+      </p:sp>
+      <p:sp>
+        <p:nvSpPr>
+          <p:cNvPr id="3" name="Content Placeholder 2">
+            <a:extLst>
+              <a:ext uri="{FF2B5EF4-FFF2-40B4-BE49-F238E27FC236}">
+                <a16:creationId xmlns:a16="http://schemas.microsoft.com/office/drawing/2014/main" id="{74297070-D3CE-AEF7-74BE-4A44A85F7AEC}"/>
+              </a:ext>
+            </a:extLst>
+          </p:cNvPr>
+          <p:cNvSpPr>
+            <a:spLocks noGrp="1"/>
+          </p:cNvSpPr>
+          <p:nvPr>
+            <p:ph idx="1"/>
+          </p:nvPr>
+        </p:nvSpPr>
+        <p:spPr/>
+        <p:txBody>
+          <a:bodyPr>
+            <a:normAutofit fontScale="70000" lnSpcReduction="20000"/>
+          </a:bodyPr>
+          <a:lstStyle/>
+          <a:p>
+            <a:pPr marL="0" indent="0">
+              <a:buNone/>
+            </a:pPr>
+            <a:r>
+              <a:rPr lang="en-US" dirty="0"/>
+              <a:t>Some dependencies exist because an object </a:t>
+            </a:r>
+            <a:r>
+              <a:rPr lang="en-US" b="1" dirty="0"/>
+              <a:t>stores state</a:t>
+            </a:r>
+            <a:r>
+              <a:rPr lang="en-US" dirty="0"/>
+              <a:t>, not because it needs something temporarily during execution.</a:t>
+            </a:r>
+          </a:p>
+          <a:p>
+            <a:r>
+              <a:rPr lang="en-US" b="1" dirty="0"/>
+              <a:t>Represent persistent structure</a:t>
+            </a:r>
+            <a:br>
+              <a:rPr lang="en-US" b="1" dirty="0"/>
+            </a:br>
+            <a:r>
+              <a:rPr lang="en-US" dirty="0"/>
+              <a:t>These dependencies exist as </a:t>
+            </a:r>
+            <a:r>
+              <a:rPr lang="en-US" b="1" dirty="0"/>
+              <a:t>fields</a:t>
+            </a:r>
+            <a:r>
+              <a:rPr lang="en-US" dirty="0"/>
+              <a:t> and are part of the object’s long-term state.</a:t>
+            </a:r>
+          </a:p>
+          <a:p>
+            <a:r>
+              <a:rPr lang="en-US" b="1" dirty="0"/>
+              <a:t>Express object relationships</a:t>
+            </a:r>
+            <a:br>
+              <a:rPr lang="en-US" b="1" dirty="0"/>
+            </a:br>
+            <a:r>
+              <a:rPr lang="en-US" dirty="0"/>
+              <a:t>Association, aggregation, and composition describe </a:t>
+            </a:r>
+            <a:r>
+              <a:rPr lang="en-US" i="1" dirty="0"/>
+              <a:t>how objects are connected</a:t>
+            </a:r>
+            <a:r>
+              <a:rPr lang="en-US" dirty="0"/>
+              <a:t>, not how methods execute.</a:t>
+            </a:r>
+          </a:p>
+          <a:p>
+            <a:r>
+              <a:rPr lang="en-US" b="1" dirty="0"/>
+              <a:t>Survive across method calls</a:t>
+            </a:r>
+            <a:br>
+              <a:rPr lang="en-US" b="1" dirty="0"/>
+            </a:br>
+            <a:r>
+              <a:rPr lang="en-US" dirty="0"/>
+              <a:t>These relationships exist beyond a single operation or call stack.</a:t>
+            </a:r>
+          </a:p>
+          <a:p>
+            <a:r>
+              <a:rPr lang="en-US" b="1" dirty="0"/>
+              <a:t>Communicate design intent</a:t>
+            </a:r>
+            <a:br>
+              <a:rPr lang="en-US" b="1" dirty="0"/>
+            </a:br>
+            <a:r>
+              <a:rPr lang="en-US" dirty="0"/>
+              <a:t>UML structural arrows show ownership, replaceability, and lifecycle expectations.</a:t>
+            </a:r>
+          </a:p>
+          <a:p>
+            <a:r>
+              <a:rPr lang="en-US" b="1" dirty="0"/>
+              <a:t>Form the object graph</a:t>
+            </a:r>
+            <a:br>
+              <a:rPr lang="en-US" b="1" dirty="0"/>
+            </a:br>
+            <a:r>
+              <a:rPr lang="en-US" dirty="0"/>
+              <a:t>These dependencies define the system’s shape at runtime.</a:t>
+            </a:r>
+          </a:p>
+        </p:txBody>
+      </p:sp>
+    </p:spTree>
+    <p:extLst>
+      <p:ext uri="{BB962C8B-B14F-4D97-AF65-F5344CB8AC3E}">
+        <p14:creationId xmlns:p14="http://schemas.microsoft.com/office/powerpoint/2010/main" val="1330323667"/>
+      </p:ext>
+    </p:extLst>
+  </p:cSld>
+  <p:clrMapOvr>
+    <a:masterClrMapping/>
+  </p:clrMapOvr>
+</p:sld>
+</file>
+
+<file path=ppt/slides/slide16.xml><?xml version="1.0" encoding="utf-8"?>
+<p:sld xmlns:a="http://schemas.openxmlformats.org/drawingml/2006/main" xmlns:r="http://schemas.openxmlformats.org/officeDocument/2006/relationships" xmlns:p="http://schemas.openxmlformats.org/presentationml/2006/main">
+  <p:cSld>
+    <p:spTree>
+      <p:nvGrpSpPr>
+        <p:cNvPr id="1" name=""/>
+        <p:cNvGrpSpPr/>
+        <p:nvPr/>
+      </p:nvGrpSpPr>
+      <p:grpSpPr>
+        <a:xfrm>
+          <a:off x="0" y="0"/>
+          <a:ext cx="0" cy="0"/>
+          <a:chOff x="0" y="0"/>
+          <a:chExt cx="0" cy="0"/>
+        </a:xfrm>
+      </p:grpSpPr>
+      <p:sp>
+        <p:nvSpPr>
+          <p:cNvPr id="2" name="Title 1"/>
+          <p:cNvSpPr>
+            <a:spLocks noGrp="1"/>
+          </p:cNvSpPr>
+          <p:nvPr>
+            <p:ph type="title"/>
+          </p:nvPr>
+        </p:nvSpPr>
+        <p:spPr/>
+        <p:txBody>
+          <a:bodyPr/>
+          <a:lstStyle/>
+          <a:p>
+            <a:r>
+              <a:rPr dirty="0"/>
+              <a:t>What Dependencies Reveal</a:t>
+            </a:r>
+          </a:p>
+        </p:txBody>
+      </p:sp>
+      <p:sp>
+        <p:nvSpPr>
+          <p:cNvPr id="3" name="Content Placeholder 2"/>
+          <p:cNvSpPr>
+            <a:spLocks noGrp="1"/>
+          </p:cNvSpPr>
+          <p:nvPr>
+            <p:ph idx="1"/>
+          </p:nvPr>
+        </p:nvSpPr>
+        <p:spPr>
+          <a:xfrm>
+            <a:off x="1364931" y="2199504"/>
+            <a:ext cx="5048228" cy="2773212"/>
+          </a:xfrm>
+        </p:spPr>
+        <p:txBody>
+          <a:bodyPr>
+            <a:normAutofit fontScale="92500" lnSpcReduction="20000"/>
+          </a:bodyPr>
+          <a:lstStyle/>
+          <a:p>
+            <a:pPr marL="0" indent="0">
+              <a:buNone/>
+            </a:pPr>
+            <a:r>
+              <a:rPr lang="en-US" dirty="0"/>
+              <a:t>Dense or tangled structures are easier to spot in diagrams than in code. </a:t>
+            </a:r>
+          </a:p>
+          <a:p>
+            <a:pPr marL="0" indent="0">
+              <a:buNone/>
+            </a:pPr>
+            <a:r>
+              <a:rPr lang="en-US" dirty="0"/>
+              <a:t>This is often where students first notice over-coupling or god classes.</a:t>
+            </a:r>
+          </a:p>
+          <a:p>
+            <a:r>
+              <a:rPr dirty="0"/>
+              <a:t>Object lifetime relationships</a:t>
+            </a:r>
+          </a:p>
+          <a:p>
+            <a:pPr lvl="1"/>
+            <a:r>
+              <a:rPr dirty="0"/>
+              <a:t>Tight vs loose coupling</a:t>
+            </a:r>
+          </a:p>
+          <a:p>
+            <a:pPr lvl="1"/>
+            <a:r>
+              <a:rPr dirty="0"/>
+              <a:t>Potential design smells</a:t>
+            </a:r>
+          </a:p>
+        </p:txBody>
+      </p:sp>
+      <p:pic>
+        <p:nvPicPr>
+          <p:cNvPr id="4" name="Picture 3">
+            <a:extLst>
+              <a:ext uri="{FF2B5EF4-FFF2-40B4-BE49-F238E27FC236}">
+                <a16:creationId xmlns:a16="http://schemas.microsoft.com/office/drawing/2014/main" id="{A3A8C1F9-A317-C84A-FF63-72EB02CF37C3}"/>
+              </a:ext>
+            </a:extLst>
+          </p:cNvPr>
+          <p:cNvPicPr>
+            <a:picLocks noChangeAspect="1"/>
+          </p:cNvPicPr>
+          <p:nvPr/>
+        </p:nvPicPr>
+        <p:blipFill>
+          <a:blip r:embed="rId3"/>
+          <a:stretch>
+            <a:fillRect/>
+          </a:stretch>
+        </p:blipFill>
+        <p:spPr>
+          <a:xfrm>
+            <a:off x="6590973" y="2130124"/>
+            <a:ext cx="4646001" cy="3804519"/>
+          </a:xfrm>
+          <a:prstGeom prst="rect">
+            <a:avLst/>
+          </a:prstGeom>
+        </p:spPr>
+      </p:pic>
+    </p:spTree>
+  </p:cSld>
+  <p:clrMapOvr>
+    <a:masterClrMapping/>
+  </p:clrMapOvr>
+</p:sld>
+</file>
+
+<file path=ppt/slides/slide17.xml><?xml version="1.0" encoding="utf-8"?>
 <p:sld xmlns:a="http://schemas.openxmlformats.org/drawingml/2006/main" xmlns:r="http://schemas.openxmlformats.org/officeDocument/2006/relationships" xmlns:p="http://schemas.openxmlformats.org/presentationml/2006/main">
   <p:cSld>
     <p:spTree>
@@ -7069,7 +7809,7 @@
           <a:p>
             <a:r>
               <a:rPr lang="en-US" dirty="0"/>
-              <a:t>Association / Structural</a:t>
+              <a:t>Association / State-Level Structural</a:t>
             </a:r>
           </a:p>
         </p:txBody>
@@ -7116,7 +7856,7 @@
 </p:sld>
 </file>
 
-<file path=ppt/slides/slide13.xml><?xml version="1.0" encoding="utf-8"?>
+<file path=ppt/slides/slide18.xml><?xml version="1.0" encoding="utf-8"?>
 <p:sld xmlns:a="http://schemas.openxmlformats.org/drawingml/2006/main" xmlns:r="http://schemas.openxmlformats.org/officeDocument/2006/relationships" xmlns:p="http://schemas.openxmlformats.org/presentationml/2006/main">
   <p:cSld>
     <p:spTree>
@@ -7162,7 +7902,7 @@
           <a:p>
             <a:r>
               <a:rPr lang="en-US" dirty="0"/>
-              <a:t>Aggregation / Structural</a:t>
+              <a:t>Aggregation / State-Level Structural</a:t>
             </a:r>
           </a:p>
         </p:txBody>
@@ -7209,7 +7949,7 @@
 </p:sld>
 </file>
 
-<file path=ppt/slides/slide14.xml><?xml version="1.0" encoding="utf-8"?>
+<file path=ppt/slides/slide19.xml><?xml version="1.0" encoding="utf-8"?>
 <p:sld xmlns:a="http://schemas.openxmlformats.org/drawingml/2006/main" xmlns:r="http://schemas.openxmlformats.org/officeDocument/2006/relationships" xmlns:p="http://schemas.openxmlformats.org/presentationml/2006/main">
   <p:cSld>
     <p:spTree>
@@ -7255,7 +7995,7 @@
           <a:p>
             <a:r>
               <a:rPr lang="en-US" dirty="0"/>
-              <a:t>Composition / Structural</a:t>
+              <a:t>Composition / State-Level Structural</a:t>
             </a:r>
           </a:p>
         </p:txBody>
@@ -7302,523 +8042,6 @@
 </p:sld>
 </file>
 
-<file path=ppt/slides/slide15.xml><?xml version="1.0" encoding="utf-8"?>
-<p:sld xmlns:a="http://schemas.openxmlformats.org/drawingml/2006/main" xmlns:r="http://schemas.openxmlformats.org/officeDocument/2006/relationships" xmlns:p="http://schemas.openxmlformats.org/presentationml/2006/main">
-  <p:cSld>
-    <p:spTree>
-      <p:nvGrpSpPr>
-        <p:cNvPr id="1" name=""/>
-        <p:cNvGrpSpPr/>
-        <p:nvPr/>
-      </p:nvGrpSpPr>
-      <p:grpSpPr>
-        <a:xfrm>
-          <a:off x="0" y="0"/>
-          <a:ext cx="0" cy="0"/>
-          <a:chOff x="0" y="0"/>
-          <a:chExt cx="0" cy="0"/>
-        </a:xfrm>
-      </p:grpSpPr>
-      <p:sp>
-        <p:nvSpPr>
-          <p:cNvPr id="2" name="Title 1"/>
-          <p:cNvSpPr>
-            <a:spLocks noGrp="1"/>
-          </p:cNvSpPr>
-          <p:nvPr>
-            <p:ph type="title"/>
-          </p:nvPr>
-        </p:nvSpPr>
-        <p:spPr/>
-        <p:txBody>
-          <a:bodyPr/>
-          <a:lstStyle/>
-          <a:p>
-            <a:r>
-              <a:rPr dirty="0"/>
-              <a:t>Why Usage Dependencies Matter</a:t>
-            </a:r>
-          </a:p>
-        </p:txBody>
-      </p:sp>
-      <p:sp>
-        <p:nvSpPr>
-          <p:cNvPr id="3" name="Content Placeholder 2"/>
-          <p:cNvSpPr>
-            <a:spLocks noGrp="1"/>
-          </p:cNvSpPr>
-          <p:nvPr>
-            <p:ph idx="1"/>
-          </p:nvPr>
-        </p:nvSpPr>
-        <p:spPr/>
-        <p:txBody>
-          <a:bodyPr/>
-          <a:lstStyle/>
-          <a:p>
-            <a:r>
-              <a:rPr lang="en-US" dirty="0"/>
-              <a:t>While performing your design, consider this: “Does this class really need to own this dependency, or does it only need it temporarily?”</a:t>
-            </a:r>
-          </a:p>
-          <a:p>
-            <a:r>
-              <a:rPr dirty="0"/>
-              <a:t>Reduce unnecessary coupling</a:t>
-            </a:r>
-          </a:p>
-          <a:p>
-            <a:pPr lvl="1"/>
-            <a:r>
-              <a:rPr dirty="0"/>
-              <a:t>Clarify required collaborators</a:t>
-            </a:r>
-          </a:p>
-          <a:p>
-            <a:pPr lvl="1"/>
-            <a:r>
-              <a:rPr dirty="0"/>
-              <a:t>Support cleaner APIs</a:t>
-            </a:r>
-          </a:p>
-        </p:txBody>
-      </p:sp>
-    </p:spTree>
-  </p:cSld>
-  <p:clrMapOvr>
-    <a:masterClrMapping/>
-  </p:clrMapOvr>
-</p:sld>
-</file>
-
-<file path=ppt/slides/slide16.xml><?xml version="1.0" encoding="utf-8"?>
-<p:sld xmlns:a="http://schemas.openxmlformats.org/drawingml/2006/main" xmlns:r="http://schemas.openxmlformats.org/officeDocument/2006/relationships" xmlns:p="http://schemas.openxmlformats.org/presentationml/2006/main">
-  <p:cSld>
-    <p:spTree>
-      <p:nvGrpSpPr>
-        <p:cNvPr id="1" name=""/>
-        <p:cNvGrpSpPr/>
-        <p:nvPr/>
-      </p:nvGrpSpPr>
-      <p:grpSpPr>
-        <a:xfrm>
-          <a:off x="0" y="0"/>
-          <a:ext cx="0" cy="0"/>
-          <a:chOff x="0" y="0"/>
-          <a:chExt cx="0" cy="0"/>
-        </a:xfrm>
-      </p:grpSpPr>
-      <p:sp>
-        <p:nvSpPr>
-          <p:cNvPr id="2" name="Title 1"/>
-          <p:cNvSpPr>
-            <a:spLocks noGrp="1"/>
-          </p:cNvSpPr>
-          <p:nvPr>
-            <p:ph type="title"/>
-          </p:nvPr>
-        </p:nvSpPr>
-        <p:spPr/>
-        <p:txBody>
-          <a:bodyPr/>
-          <a:lstStyle/>
-          <a:p>
-            <a:r>
-              <a:rPr dirty="0"/>
-              <a:t>Interfaces vs Concrete Dependencies</a:t>
-            </a:r>
-          </a:p>
-        </p:txBody>
-      </p:sp>
-      <p:sp>
-        <p:nvSpPr>
-          <p:cNvPr id="3" name="Content Placeholder 2"/>
-          <p:cNvSpPr>
-            <a:spLocks noGrp="1"/>
-          </p:cNvSpPr>
-          <p:nvPr>
-            <p:ph idx="1"/>
-          </p:nvPr>
-        </p:nvSpPr>
-        <p:spPr/>
-        <p:txBody>
-          <a:bodyPr/>
-          <a:lstStyle/>
-          <a:p>
-            <a:pPr marL="0" indent="0">
-              <a:buNone/>
-            </a:pPr>
-            <a:r>
-              <a:rPr lang="en-US" dirty="0"/>
-              <a:t>Interfaces describe capability </a:t>
-            </a:r>
-            <a:r>
-              <a:rPr lang="en-US" i="1" dirty="0"/>
-              <a:t>without commitment</a:t>
-            </a:r>
-            <a:r>
-              <a:rPr lang="en-US" dirty="0"/>
-              <a:t>. </a:t>
-            </a:r>
-          </a:p>
-          <a:p>
-            <a:pPr marL="0" indent="0">
-              <a:buNone/>
-            </a:pPr>
-            <a:r>
-              <a:rPr lang="en-US" dirty="0"/>
-              <a:t>Diagrams make this distinction obvious and visible.</a:t>
-            </a:r>
-          </a:p>
-          <a:p>
-            <a:r>
-              <a:rPr dirty="0"/>
-              <a:t>Interfaces express contracts</a:t>
-            </a:r>
-          </a:p>
-          <a:p>
-            <a:pPr lvl="1"/>
-            <a:r>
-              <a:rPr dirty="0"/>
-              <a:t>Concrete classes express decisions</a:t>
-            </a:r>
-          </a:p>
-          <a:p>
-            <a:pPr lvl="1"/>
-            <a:r>
-              <a:rPr dirty="0"/>
-              <a:t>Prefer depending on abstractions</a:t>
-            </a:r>
-          </a:p>
-        </p:txBody>
-      </p:sp>
-    </p:spTree>
-  </p:cSld>
-  <p:clrMapOvr>
-    <a:masterClrMapping/>
-  </p:clrMapOvr>
-</p:sld>
-</file>
-
-<file path=ppt/slides/slide17.xml><?xml version="1.0" encoding="utf-8"?>
-<p:sld xmlns:a="http://schemas.openxmlformats.org/drawingml/2006/main" xmlns:r="http://schemas.openxmlformats.org/officeDocument/2006/relationships" xmlns:p="http://schemas.openxmlformats.org/presentationml/2006/main">
-  <p:cSld>
-    <p:spTree>
-      <p:nvGrpSpPr>
-        <p:cNvPr id="1" name="">
-          <a:extLst>
-            <a:ext uri="{FF2B5EF4-FFF2-40B4-BE49-F238E27FC236}">
-              <a16:creationId xmlns:a16="http://schemas.microsoft.com/office/drawing/2014/main" id="{6513E7AA-B9D1-AB8F-198E-EA01AF5C0F1D}"/>
-            </a:ext>
-          </a:extLst>
-        </p:cNvPr>
-        <p:cNvGrpSpPr/>
-        <p:nvPr/>
-      </p:nvGrpSpPr>
-      <p:grpSpPr>
-        <a:xfrm>
-          <a:off x="0" y="0"/>
-          <a:ext cx="0" cy="0"/>
-          <a:chOff x="0" y="0"/>
-          <a:chExt cx="0" cy="0"/>
-        </a:xfrm>
-      </p:grpSpPr>
-      <p:sp>
-        <p:nvSpPr>
-          <p:cNvPr id="2" name="Title 1">
-            <a:extLst>
-              <a:ext uri="{FF2B5EF4-FFF2-40B4-BE49-F238E27FC236}">
-                <a16:creationId xmlns:a16="http://schemas.microsoft.com/office/drawing/2014/main" id="{66EBDCB7-F2F1-8C4D-B372-D0FB620163A2}"/>
-              </a:ext>
-            </a:extLst>
-          </p:cNvPr>
-          <p:cNvSpPr>
-            <a:spLocks noGrp="1"/>
-          </p:cNvSpPr>
-          <p:nvPr>
-            <p:ph type="title"/>
-          </p:nvPr>
-        </p:nvSpPr>
-        <p:spPr/>
-        <p:txBody>
-          <a:bodyPr/>
-          <a:lstStyle/>
-          <a:p>
-            <a:r>
-              <a:rPr dirty="0"/>
-              <a:t>Interfaces vs Concrete Dependencies</a:t>
-            </a:r>
-          </a:p>
-        </p:txBody>
-      </p:sp>
-      <p:pic>
-        <p:nvPicPr>
-          <p:cNvPr id="7" name="Picture 6">
-            <a:extLst>
-              <a:ext uri="{FF2B5EF4-FFF2-40B4-BE49-F238E27FC236}">
-                <a16:creationId xmlns:a16="http://schemas.microsoft.com/office/drawing/2014/main" id="{A34E9862-DBF3-0864-0B3A-1FD617D36FEB}"/>
-              </a:ext>
-            </a:extLst>
-          </p:cNvPr>
-          <p:cNvPicPr>
-            <a:picLocks noChangeAspect="1"/>
-          </p:cNvPicPr>
-          <p:nvPr/>
-        </p:nvPicPr>
-        <p:blipFill>
-          <a:blip r:embed="rId3"/>
-          <a:stretch>
-            <a:fillRect/>
-          </a:stretch>
-        </p:blipFill>
-        <p:spPr>
-          <a:xfrm>
-            <a:off x="1279301" y="1885285"/>
-            <a:ext cx="9633398" cy="3188813"/>
-          </a:xfrm>
-          <a:prstGeom prst="rect">
-            <a:avLst/>
-          </a:prstGeom>
-        </p:spPr>
-      </p:pic>
-    </p:spTree>
-    <p:extLst>
-      <p:ext uri="{BB962C8B-B14F-4D97-AF65-F5344CB8AC3E}">
-        <p14:creationId xmlns:p14="http://schemas.microsoft.com/office/powerpoint/2010/main" val="3879621403"/>
-      </p:ext>
-    </p:extLst>
-  </p:cSld>
-  <p:clrMapOvr>
-    <a:masterClrMapping/>
-  </p:clrMapOvr>
-</p:sld>
-</file>
-
-<file path=ppt/slides/slide18.xml><?xml version="1.0" encoding="utf-8"?>
-<p:sld xmlns:a="http://schemas.openxmlformats.org/drawingml/2006/main" xmlns:r="http://schemas.openxmlformats.org/officeDocument/2006/relationships" xmlns:p="http://schemas.openxmlformats.org/presentationml/2006/main">
-  <p:cSld>
-    <p:spTree>
-      <p:nvGrpSpPr>
-        <p:cNvPr id="1" name=""/>
-        <p:cNvGrpSpPr/>
-        <p:nvPr/>
-      </p:nvGrpSpPr>
-      <p:grpSpPr>
-        <a:xfrm>
-          <a:off x="0" y="0"/>
-          <a:ext cx="0" cy="0"/>
-          <a:chOff x="0" y="0"/>
-          <a:chExt cx="0" cy="0"/>
-        </a:xfrm>
-      </p:grpSpPr>
-      <p:sp>
-        <p:nvSpPr>
-          <p:cNvPr id="2" name="Title 1"/>
-          <p:cNvSpPr>
-            <a:spLocks noGrp="1"/>
-          </p:cNvSpPr>
-          <p:nvPr>
-            <p:ph type="title"/>
-          </p:nvPr>
-        </p:nvSpPr>
-        <p:spPr/>
-        <p:txBody>
-          <a:bodyPr/>
-          <a:lstStyle/>
-          <a:p>
-            <a:r>
-              <a:rPr dirty="0"/>
-              <a:t>Seeing Abstractions Visually</a:t>
-            </a:r>
-          </a:p>
-        </p:txBody>
-      </p:sp>
-      <p:sp>
-        <p:nvSpPr>
-          <p:cNvPr id="3" name="Content Placeholder 2"/>
-          <p:cNvSpPr>
-            <a:spLocks noGrp="1"/>
-          </p:cNvSpPr>
-          <p:nvPr>
-            <p:ph idx="1"/>
-          </p:nvPr>
-        </p:nvSpPr>
-        <p:spPr>
-          <a:xfrm>
-            <a:off x="2773599" y="2052116"/>
-            <a:ext cx="7796540" cy="2920600"/>
-          </a:xfrm>
-        </p:spPr>
-        <p:txBody>
-          <a:bodyPr>
-            <a:normAutofit/>
-          </a:bodyPr>
-          <a:lstStyle/>
-          <a:p>
-            <a:pPr marL="0" indent="0">
-              <a:buNone/>
-            </a:pPr>
-            <a:r>
-              <a:rPr lang="en-US" dirty="0"/>
-              <a:t>Patterns like Strategy and Observer become much clearer when interfaces are visible and not hidden behind concrete implementations.</a:t>
-            </a:r>
-          </a:p>
-          <a:p>
-            <a:r>
-              <a:rPr dirty="0"/>
-              <a:t>Interfaces as first-class elements</a:t>
-            </a:r>
-          </a:p>
-          <a:p>
-            <a:pPr lvl="1"/>
-            <a:r>
-              <a:rPr dirty="0"/>
-              <a:t>Multiple realizations</a:t>
-            </a:r>
-          </a:p>
-          <a:p>
-            <a:pPr lvl="1"/>
-            <a:r>
-              <a:rPr dirty="0"/>
-              <a:t>Pluggable behavior</a:t>
-            </a:r>
-          </a:p>
-        </p:txBody>
-      </p:sp>
-      <p:pic>
-        <p:nvPicPr>
-          <p:cNvPr id="4" name="Picture 3">
-            <a:extLst>
-              <a:ext uri="{FF2B5EF4-FFF2-40B4-BE49-F238E27FC236}">
-                <a16:creationId xmlns:a16="http://schemas.microsoft.com/office/drawing/2014/main" id="{08CA1C65-2F08-000B-DE99-E765553AAEF9}"/>
-              </a:ext>
-            </a:extLst>
-          </p:cNvPr>
-          <p:cNvPicPr>
-            <a:picLocks noChangeAspect="1"/>
-          </p:cNvPicPr>
-          <p:nvPr/>
-        </p:nvPicPr>
-        <p:blipFill>
-          <a:blip r:embed="rId3"/>
-          <a:stretch>
-            <a:fillRect/>
-          </a:stretch>
-        </p:blipFill>
-        <p:spPr>
-          <a:xfrm>
-            <a:off x="6096000" y="4355024"/>
-            <a:ext cx="5782639" cy="1914148"/>
-          </a:xfrm>
-          <a:prstGeom prst="rect">
-            <a:avLst/>
-          </a:prstGeom>
-        </p:spPr>
-      </p:pic>
-    </p:spTree>
-  </p:cSld>
-  <p:clrMapOvr>
-    <a:masterClrMapping/>
-  </p:clrMapOvr>
-</p:sld>
-</file>
-
-<file path=ppt/slides/slide19.xml><?xml version="1.0" encoding="utf-8"?>
-<p:sld xmlns:a="http://schemas.openxmlformats.org/drawingml/2006/main" xmlns:r="http://schemas.openxmlformats.org/officeDocument/2006/relationships" xmlns:p="http://schemas.openxmlformats.org/presentationml/2006/main">
-  <p:cSld>
-    <p:spTree>
-      <p:nvGrpSpPr>
-        <p:cNvPr id="1" name=""/>
-        <p:cNvGrpSpPr/>
-        <p:nvPr/>
-      </p:nvGrpSpPr>
-      <p:grpSpPr>
-        <a:xfrm>
-          <a:off x="0" y="0"/>
-          <a:ext cx="0" cy="0"/>
-          <a:chOff x="0" y="0"/>
-          <a:chExt cx="0" cy="0"/>
-        </a:xfrm>
-      </p:grpSpPr>
-      <p:sp>
-        <p:nvSpPr>
-          <p:cNvPr id="2" name="Title 1"/>
-          <p:cNvSpPr>
-            <a:spLocks noGrp="1"/>
-          </p:cNvSpPr>
-          <p:nvPr>
-            <p:ph type="title"/>
-          </p:nvPr>
-        </p:nvSpPr>
-        <p:spPr/>
-        <p:txBody>
-          <a:bodyPr/>
-          <a:lstStyle/>
-          <a:p>
-            <a:r>
-              <a:rPr dirty="0"/>
-              <a:t>Focused Design Discussions</a:t>
-            </a:r>
-          </a:p>
-        </p:txBody>
-      </p:sp>
-      <p:sp>
-        <p:nvSpPr>
-          <p:cNvPr id="3" name="Content Placeholder 2"/>
-          <p:cNvSpPr>
-            <a:spLocks noGrp="1"/>
-          </p:cNvSpPr>
-          <p:nvPr>
-            <p:ph idx="1"/>
-          </p:nvPr>
-        </p:nvSpPr>
-        <p:spPr/>
-        <p:txBody>
-          <a:bodyPr/>
-          <a:lstStyle/>
-          <a:p>
-            <a:pPr marL="0" indent="0">
-              <a:buNone/>
-            </a:pPr>
-            <a:r>
-              <a:rPr lang="en-US" b="1" dirty="0"/>
-              <a:t>Good diagrams are selective!</a:t>
-            </a:r>
-            <a:r>
-              <a:rPr lang="en-US" dirty="0"/>
-              <a:t> Diagram what matters for the decision you are considering, not everything that exists.</a:t>
-            </a:r>
-          </a:p>
-          <a:p>
-            <a:r>
-              <a:rPr dirty="0"/>
-              <a:t>Limit diagrams to key classes</a:t>
-            </a:r>
-          </a:p>
-          <a:p>
-            <a:pPr lvl="1"/>
-            <a:r>
-              <a:rPr dirty="0"/>
-              <a:t>Avoid giant system diagrams</a:t>
-            </a:r>
-          </a:p>
-          <a:p>
-            <a:pPr lvl="1"/>
-            <a:r>
-              <a:rPr dirty="0"/>
-              <a:t>Design is contextual</a:t>
-            </a:r>
-          </a:p>
-        </p:txBody>
-      </p:sp>
-    </p:spTree>
-  </p:cSld>
-  <p:clrMapOvr>
-    <a:masterClrMapping/>
-  </p:clrMapOvr>
-</p:sld>
-</file>
-
 <file path=ppt/slides/slide2.xml><?xml version="1.0" encoding="utf-8"?>
 <p:sld xmlns:a="http://schemas.openxmlformats.org/drawingml/2006/main" xmlns:r="http://schemas.openxmlformats.org/officeDocument/2006/relationships" xmlns:p="http://schemas.openxmlformats.org/presentationml/2006/main">
   <p:cSld>
@@ -8297,7 +8520,15 @@
           <a:p>
             <a:r>
               <a:rPr dirty="0"/>
-              <a:t>Why Diagrams Beat Code for Discussion</a:t>
+              <a:t>Why </a:t>
+            </a:r>
+            <a:r>
+              <a:rPr lang="en-US" dirty="0"/>
+              <a:t>State-Level</a:t>
+            </a:r>
+            <a:r>
+              <a:rPr dirty="0"/>
+              <a:t> Dependencies Matter</a:t>
             </a:r>
           </a:p>
         </p:txBody>
@@ -8317,41 +8548,29 @@
           <a:bodyPr/>
           <a:lstStyle/>
           <a:p>
-            <a:pPr marL="0" indent="0">
-              <a:buNone/>
-            </a:pPr>
-            <a:r>
-              <a:rPr lang="en-US" b="1" dirty="0"/>
-              <a:t>Reading code is serial and slow. </a:t>
-            </a:r>
-          </a:p>
-          <a:p>
-            <a:pPr marL="0" indent="0">
-              <a:buNone/>
-            </a:pPr>
             <a:r>
               <a:rPr lang="en-US" dirty="0"/>
-              <a:t>Diagrams allow parallel understanding and quicker agreement or disagreement during reviews.</a:t>
+              <a:t>While performing your design, consider this: “Does this class really need to own this dependency, or does it only need it temporarily?”</a:t>
             </a:r>
           </a:p>
           <a:p>
             <a:r>
               <a:rPr dirty="0"/>
-              <a:t>Easier to reason about structure</a:t>
+              <a:t>Reduce unnecessary coupling</a:t>
             </a:r>
           </a:p>
           <a:p>
             <a:pPr lvl="1"/>
             <a:r>
               <a:rPr dirty="0"/>
-              <a:t>Less cognitive load</a:t>
+              <a:t>Clarify required collaborators</a:t>
             </a:r>
           </a:p>
           <a:p>
             <a:pPr lvl="1"/>
             <a:r>
               <a:rPr dirty="0"/>
-              <a:t>Supports group conversation</a:t>
+              <a:t>Support cleaner APIs</a:t>
             </a:r>
           </a:p>
         </p:txBody>
@@ -8398,7 +8617,7 @@
           <a:p>
             <a:r>
               <a:rPr dirty="0"/>
-              <a:t>Pull Requests &amp; Design Defense</a:t>
+              <a:t>Seeing Abstractions Visually</a:t>
             </a:r>
           </a:p>
         </p:txBody>
@@ -8413,9 +8632,16 @@
             <p:ph idx="1"/>
           </p:nvPr>
         </p:nvSpPr>
-        <p:spPr/>
-        <p:txBody>
-          <a:bodyPr/>
+        <p:spPr>
+          <a:xfrm>
+            <a:off x="2773599" y="2052116"/>
+            <a:ext cx="7796540" cy="2920600"/>
+          </a:xfrm>
+        </p:spPr>
+        <p:txBody>
+          <a:bodyPr>
+            <a:normAutofit/>
+          </a:bodyPr>
           <a:lstStyle/>
           <a:p>
             <a:pPr marL="0" indent="0">
@@ -8423,39 +8649,61 @@
             </a:pPr>
             <a:r>
               <a:rPr lang="en-US" dirty="0"/>
-              <a:t>Consider using diagrams in pull requests (PR: code you are submitting to your teammates, technical lead, open source project, etc.) for inclusion in a project or design reviews to explain </a:t>
-            </a:r>
-            <a:r>
-              <a:rPr lang="en-US" i="1" dirty="0"/>
-              <a:t>why</a:t>
-            </a:r>
-            <a:r>
-              <a:rPr lang="en-US" dirty="0"/>
-              <a:t> something is built a certain way instead of arguing line-by-line in code.</a:t>
+              <a:t>Patterns like Strategy and Observer become much clearer when interfaces are visible and not hidden behind concrete implementations.</a:t>
             </a:r>
           </a:p>
           <a:p>
             <a:r>
               <a:rPr dirty="0"/>
-              <a:t>Explain intent visually</a:t>
+              <a:t>Interfaces as first-class elements</a:t>
             </a:r>
           </a:p>
           <a:p>
             <a:pPr lvl="1"/>
             <a:r>
               <a:rPr dirty="0"/>
-              <a:t>Justify abstractions</a:t>
+              <a:t>Multiple realizations</a:t>
             </a:r>
           </a:p>
           <a:p>
             <a:pPr lvl="1"/>
             <a:r>
               <a:rPr dirty="0"/>
-              <a:t>Highlight dependency choices</a:t>
-            </a:r>
-          </a:p>
-        </p:txBody>
-      </p:sp>
+              <a:t>Pluggable behavior</a:t>
+            </a:r>
+          </a:p>
+        </p:txBody>
+      </p:sp>
+      <p:pic>
+        <p:nvPicPr>
+          <p:cNvPr id="4" name="Picture 3">
+            <a:extLst>
+              <a:ext uri="{FF2B5EF4-FFF2-40B4-BE49-F238E27FC236}">
+                <a16:creationId xmlns:a16="http://schemas.microsoft.com/office/drawing/2014/main" id="{08CA1C65-2F08-000B-DE99-E765553AAEF9}"/>
+              </a:ext>
+            </a:extLst>
+          </p:cNvPr>
+          <p:cNvPicPr>
+            <a:picLocks noChangeAspect="1"/>
+          </p:cNvPicPr>
+          <p:nvPr/>
+        </p:nvPicPr>
+        <p:blipFill>
+          <a:blip r:embed="rId3"/>
+          <a:stretch>
+            <a:fillRect/>
+          </a:stretch>
+        </p:blipFill>
+        <p:spPr>
+          <a:xfrm>
+            <a:off x="6096000" y="4355024"/>
+            <a:ext cx="5782639" cy="1914148"/>
+          </a:xfrm>
+          <a:prstGeom prst="rect">
+            <a:avLst/>
+          </a:prstGeom>
+        </p:spPr>
+      </p:pic>
     </p:spTree>
   </p:cSld>
   <p:clrMapOvr>
@@ -8498,7 +8746,7 @@
           <a:p>
             <a:r>
               <a:rPr dirty="0"/>
-              <a:t>Responsibility Boundaries</a:t>
+              <a:t>Focused Design Discussions</a:t>
             </a:r>
           </a:p>
         </p:txBody>
@@ -8522,46 +8770,32 @@
               <a:buNone/>
             </a:pPr>
             <a:r>
+              <a:rPr lang="en-US" b="1" dirty="0"/>
+              <a:t>Good diagrams are selective!</a:t>
+            </a:r>
+            <a:r>
               <a:rPr lang="en-US" dirty="0"/>
-              <a:t>Each class box invites questions. </a:t>
-            </a:r>
-          </a:p>
-          <a:p>
-            <a:pPr marL="0" indent="0">
-              <a:buNone/>
-            </a:pPr>
-            <a:r>
-              <a:rPr lang="en-US" dirty="0"/>
-              <a:t>Too many relationships often indicate too many responsibilities.</a:t>
-            </a:r>
-          </a:p>
-          <a:p>
-            <a:pPr marL="0" indent="0">
-              <a:buNone/>
-            </a:pPr>
-            <a:r>
-              <a:rPr lang="en-US" dirty="0"/>
-              <a:t>Try to keep each class limited to a Single Responsibility. Diagrams help spot responsibility problems that might be less visible when reading code.</a:t>
+              <a:t> Diagram what matters for the decision you are considering, not everything that exists.</a:t>
             </a:r>
           </a:p>
           <a:p>
             <a:r>
               <a:rPr dirty="0"/>
-              <a:t>Who does what?</a:t>
+              <a:t>Limit diagrams to key classes</a:t>
             </a:r>
           </a:p>
           <a:p>
             <a:pPr lvl="1"/>
             <a:r>
               <a:rPr dirty="0"/>
-              <a:t>Who knows about whom?</a:t>
+              <a:t>Avoid giant system diagrams</a:t>
             </a:r>
           </a:p>
           <a:p>
             <a:pPr lvl="1"/>
             <a:r>
               <a:rPr dirty="0"/>
-              <a:t>When to split classes</a:t>
+              <a:t>Design is contextual</a:t>
             </a:r>
           </a:p>
         </p:txBody>
@@ -8575,6 +8809,325 @@
 </file>
 
 <file path=ppt/slides/slide23.xml><?xml version="1.0" encoding="utf-8"?>
+<p:sld xmlns:a="http://schemas.openxmlformats.org/drawingml/2006/main" xmlns:r="http://schemas.openxmlformats.org/officeDocument/2006/relationships" xmlns:p="http://schemas.openxmlformats.org/presentationml/2006/main">
+  <p:cSld>
+    <p:spTree>
+      <p:nvGrpSpPr>
+        <p:cNvPr id="1" name=""/>
+        <p:cNvGrpSpPr/>
+        <p:nvPr/>
+      </p:nvGrpSpPr>
+      <p:grpSpPr>
+        <a:xfrm>
+          <a:off x="0" y="0"/>
+          <a:ext cx="0" cy="0"/>
+          <a:chOff x="0" y="0"/>
+          <a:chExt cx="0" cy="0"/>
+        </a:xfrm>
+      </p:grpSpPr>
+      <p:sp>
+        <p:nvSpPr>
+          <p:cNvPr id="2" name="Title 1"/>
+          <p:cNvSpPr>
+            <a:spLocks noGrp="1"/>
+          </p:cNvSpPr>
+          <p:nvPr>
+            <p:ph type="title"/>
+          </p:nvPr>
+        </p:nvSpPr>
+        <p:spPr/>
+        <p:txBody>
+          <a:bodyPr/>
+          <a:lstStyle/>
+          <a:p>
+            <a:r>
+              <a:rPr dirty="0"/>
+              <a:t>Why Diagrams Beat Code </a:t>
+            </a:r>
+            <a:br>
+              <a:rPr lang="en-US" dirty="0"/>
+            </a:br>
+            <a:r>
+              <a:rPr lang="en-US" dirty="0"/>
+              <a:t>to Promote Discussion</a:t>
+            </a:r>
+            <a:endParaRPr dirty="0"/>
+          </a:p>
+        </p:txBody>
+      </p:sp>
+      <p:sp>
+        <p:nvSpPr>
+          <p:cNvPr id="3" name="Content Placeholder 2"/>
+          <p:cNvSpPr>
+            <a:spLocks noGrp="1"/>
+          </p:cNvSpPr>
+          <p:nvPr>
+            <p:ph idx="1"/>
+          </p:nvPr>
+        </p:nvSpPr>
+        <p:spPr/>
+        <p:txBody>
+          <a:bodyPr/>
+          <a:lstStyle/>
+          <a:p>
+            <a:pPr marL="0" indent="0">
+              <a:buNone/>
+            </a:pPr>
+            <a:r>
+              <a:rPr lang="en-US" b="1" dirty="0"/>
+              <a:t>Reading code is serial and slow. </a:t>
+            </a:r>
+          </a:p>
+          <a:p>
+            <a:pPr marL="0" indent="0">
+              <a:buNone/>
+            </a:pPr>
+            <a:r>
+              <a:rPr lang="en-US" dirty="0"/>
+              <a:t>Diagrams allow parallel understanding and quicker agreement or disagreement during reviews.</a:t>
+            </a:r>
+          </a:p>
+          <a:p>
+            <a:r>
+              <a:rPr dirty="0"/>
+              <a:t>Easier to reason about structure</a:t>
+            </a:r>
+          </a:p>
+          <a:p>
+            <a:pPr lvl="1"/>
+            <a:r>
+              <a:rPr dirty="0"/>
+              <a:t>Less cognitive load</a:t>
+            </a:r>
+          </a:p>
+          <a:p>
+            <a:pPr lvl="1"/>
+            <a:r>
+              <a:rPr dirty="0"/>
+              <a:t>Supports group conversation</a:t>
+            </a:r>
+          </a:p>
+        </p:txBody>
+      </p:sp>
+    </p:spTree>
+  </p:cSld>
+  <p:clrMapOvr>
+    <a:masterClrMapping/>
+  </p:clrMapOvr>
+</p:sld>
+</file>
+
+<file path=ppt/slides/slide24.xml><?xml version="1.0" encoding="utf-8"?>
+<p:sld xmlns:a="http://schemas.openxmlformats.org/drawingml/2006/main" xmlns:r="http://schemas.openxmlformats.org/officeDocument/2006/relationships" xmlns:p="http://schemas.openxmlformats.org/presentationml/2006/main">
+  <p:cSld>
+    <p:spTree>
+      <p:nvGrpSpPr>
+        <p:cNvPr id="1" name=""/>
+        <p:cNvGrpSpPr/>
+        <p:nvPr/>
+      </p:nvGrpSpPr>
+      <p:grpSpPr>
+        <a:xfrm>
+          <a:off x="0" y="0"/>
+          <a:ext cx="0" cy="0"/>
+          <a:chOff x="0" y="0"/>
+          <a:chExt cx="0" cy="0"/>
+        </a:xfrm>
+      </p:grpSpPr>
+      <p:sp>
+        <p:nvSpPr>
+          <p:cNvPr id="2" name="Title 1"/>
+          <p:cNvSpPr>
+            <a:spLocks noGrp="1"/>
+          </p:cNvSpPr>
+          <p:nvPr>
+            <p:ph type="title"/>
+          </p:nvPr>
+        </p:nvSpPr>
+        <p:spPr/>
+        <p:txBody>
+          <a:bodyPr/>
+          <a:lstStyle/>
+          <a:p>
+            <a:r>
+              <a:rPr dirty="0"/>
+              <a:t>Pull Requests &amp; Design Defense</a:t>
+            </a:r>
+          </a:p>
+        </p:txBody>
+      </p:sp>
+      <p:sp>
+        <p:nvSpPr>
+          <p:cNvPr id="3" name="Content Placeholder 2"/>
+          <p:cNvSpPr>
+            <a:spLocks noGrp="1"/>
+          </p:cNvSpPr>
+          <p:nvPr>
+            <p:ph idx="1"/>
+          </p:nvPr>
+        </p:nvSpPr>
+        <p:spPr/>
+        <p:txBody>
+          <a:bodyPr/>
+          <a:lstStyle/>
+          <a:p>
+            <a:pPr marL="0" indent="0">
+              <a:buNone/>
+            </a:pPr>
+            <a:r>
+              <a:rPr lang="en-US" dirty="0"/>
+              <a:t>Consider using diagrams in pull requests (PR: code you are submitting to your teammates, technical lead, open source project, etc.) for inclusion in a project or design reviews to explain </a:t>
+            </a:r>
+            <a:r>
+              <a:rPr lang="en-US" i="1" dirty="0"/>
+              <a:t>why</a:t>
+            </a:r>
+            <a:r>
+              <a:rPr lang="en-US" dirty="0"/>
+              <a:t> something is built a certain way instead of arguing line-by-line in code.</a:t>
+            </a:r>
+          </a:p>
+          <a:p>
+            <a:r>
+              <a:rPr dirty="0"/>
+              <a:t>Explain intent visually</a:t>
+            </a:r>
+          </a:p>
+          <a:p>
+            <a:pPr lvl="1"/>
+            <a:r>
+              <a:rPr dirty="0"/>
+              <a:t>Justify abstractions</a:t>
+            </a:r>
+          </a:p>
+          <a:p>
+            <a:pPr lvl="1"/>
+            <a:r>
+              <a:rPr dirty="0"/>
+              <a:t>Highlight dependency choices</a:t>
+            </a:r>
+          </a:p>
+        </p:txBody>
+      </p:sp>
+    </p:spTree>
+  </p:cSld>
+  <p:clrMapOvr>
+    <a:masterClrMapping/>
+  </p:clrMapOvr>
+</p:sld>
+</file>
+
+<file path=ppt/slides/slide25.xml><?xml version="1.0" encoding="utf-8"?>
+<p:sld xmlns:a="http://schemas.openxmlformats.org/drawingml/2006/main" xmlns:r="http://schemas.openxmlformats.org/officeDocument/2006/relationships" xmlns:p="http://schemas.openxmlformats.org/presentationml/2006/main">
+  <p:cSld>
+    <p:spTree>
+      <p:nvGrpSpPr>
+        <p:cNvPr id="1" name=""/>
+        <p:cNvGrpSpPr/>
+        <p:nvPr/>
+      </p:nvGrpSpPr>
+      <p:grpSpPr>
+        <a:xfrm>
+          <a:off x="0" y="0"/>
+          <a:ext cx="0" cy="0"/>
+          <a:chOff x="0" y="0"/>
+          <a:chExt cx="0" cy="0"/>
+        </a:xfrm>
+      </p:grpSpPr>
+      <p:sp>
+        <p:nvSpPr>
+          <p:cNvPr id="2" name="Title 1"/>
+          <p:cNvSpPr>
+            <a:spLocks noGrp="1"/>
+          </p:cNvSpPr>
+          <p:nvPr>
+            <p:ph type="title"/>
+          </p:nvPr>
+        </p:nvSpPr>
+        <p:spPr/>
+        <p:txBody>
+          <a:bodyPr/>
+          <a:lstStyle/>
+          <a:p>
+            <a:r>
+              <a:rPr dirty="0"/>
+              <a:t>Responsibility Boundaries</a:t>
+            </a:r>
+          </a:p>
+        </p:txBody>
+      </p:sp>
+      <p:sp>
+        <p:nvSpPr>
+          <p:cNvPr id="3" name="Content Placeholder 2"/>
+          <p:cNvSpPr>
+            <a:spLocks noGrp="1"/>
+          </p:cNvSpPr>
+          <p:nvPr>
+            <p:ph idx="1"/>
+          </p:nvPr>
+        </p:nvSpPr>
+        <p:spPr/>
+        <p:txBody>
+          <a:bodyPr/>
+          <a:lstStyle/>
+          <a:p>
+            <a:pPr marL="0" indent="0">
+              <a:buNone/>
+            </a:pPr>
+            <a:r>
+              <a:rPr lang="en-US" dirty="0"/>
+              <a:t>Each class box invites questions. </a:t>
+            </a:r>
+          </a:p>
+          <a:p>
+            <a:pPr marL="0" indent="0">
+              <a:buNone/>
+            </a:pPr>
+            <a:r>
+              <a:rPr lang="en-US" dirty="0"/>
+              <a:t>Too many relationships often indicate too many responsibilities.</a:t>
+            </a:r>
+          </a:p>
+          <a:p>
+            <a:pPr marL="0" indent="0">
+              <a:buNone/>
+            </a:pPr>
+            <a:r>
+              <a:rPr lang="en-US" dirty="0"/>
+              <a:t>Try to keep each class limited to a Single Responsibility. Diagrams help spot responsibility problems that might be less visible when reading code.</a:t>
+            </a:r>
+          </a:p>
+          <a:p>
+            <a:r>
+              <a:rPr dirty="0"/>
+              <a:t>Who does what?</a:t>
+            </a:r>
+          </a:p>
+          <a:p>
+            <a:pPr lvl="1"/>
+            <a:r>
+              <a:rPr dirty="0"/>
+              <a:t>Who knows about whom?</a:t>
+            </a:r>
+          </a:p>
+          <a:p>
+            <a:pPr lvl="1"/>
+            <a:r>
+              <a:rPr dirty="0"/>
+              <a:t>When to split classes</a:t>
+            </a:r>
+          </a:p>
+        </p:txBody>
+      </p:sp>
+    </p:spTree>
+  </p:cSld>
+  <p:clrMapOvr>
+    <a:masterClrMapping/>
+  </p:clrMapOvr>
+</p:sld>
+</file>
+
+<file path=ppt/slides/slide26.xml><?xml version="1.0" encoding="utf-8"?>
 <p:sld xmlns:a="http://schemas.openxmlformats.org/drawingml/2006/main" xmlns:r="http://schemas.openxmlformats.org/officeDocument/2006/relationships" xmlns:p="http://schemas.openxmlformats.org/presentationml/2006/main">
   <p:cSld>
     <p:spTree>
@@ -8668,7 +9221,7 @@
 </p:sld>
 </file>
 
-<file path=ppt/slides/slide24.xml><?xml version="1.0" encoding="utf-8"?>
+<file path=ppt/slides/slide27.xml><?xml version="1.0" encoding="utf-8"?>
 <p:sld xmlns:a="http://schemas.openxmlformats.org/drawingml/2006/main" xmlns:r="http://schemas.openxmlformats.org/officeDocument/2006/relationships" xmlns:p="http://schemas.openxmlformats.org/presentationml/2006/main">
   <p:cSld>
     <p:spTree>
@@ -8792,7 +9345,7 @@
 </p:sld>
 </file>
 
-<file path=ppt/slides/slide25.xml><?xml version="1.0" encoding="utf-8"?>
+<file path=ppt/slides/slide28.xml><?xml version="1.0" encoding="utf-8"?>
 <p:sld xmlns:a="http://schemas.openxmlformats.org/drawingml/2006/main" xmlns:r="http://schemas.openxmlformats.org/officeDocument/2006/relationships" xmlns:p="http://schemas.openxmlformats.org/presentationml/2006/main">
   <p:cSld>
     <p:spTree>
@@ -8881,7 +9434,7 @@
 </p:sld>
 </file>
 
-<file path=ppt/slides/slide26.xml><?xml version="1.0" encoding="utf-8"?>
+<file path=ppt/slides/slide29.xml><?xml version="1.0" encoding="utf-8"?>
 <p:sld xmlns:a="http://schemas.openxmlformats.org/drawingml/2006/main" xmlns:r="http://schemas.openxmlformats.org/officeDocument/2006/relationships" xmlns:p="http://schemas.openxmlformats.org/presentationml/2006/main">
   <p:cSld>
     <p:spTree>
@@ -8986,7 +9539,7 @@
 </p:sld>
 </file>
 
-<file path=ppt/slides/slide27.xml><?xml version="1.0" encoding="utf-8"?>
+<file path=ppt/slides/slide3.xml><?xml version="1.0" encoding="utf-8"?>
 <p:sld xmlns:a="http://schemas.openxmlformats.org/drawingml/2006/main" xmlns:r="http://schemas.openxmlformats.org/officeDocument/2006/relationships" xmlns:p="http://schemas.openxmlformats.org/presentationml/2006/main">
   <p:cSld>
     <p:spTree>
@@ -9005,6 +9558,135 @@
       </p:grpSpPr>
       <p:sp>
         <p:nvSpPr>
+          <p:cNvPr id="2" name="Title 1">
+            <a:extLst>
+              <a:ext uri="{FF2B5EF4-FFF2-40B4-BE49-F238E27FC236}">
+                <a16:creationId xmlns:a16="http://schemas.microsoft.com/office/drawing/2014/main" id="{863445EC-5B27-6C3B-E728-DF9CB64984A0}"/>
+              </a:ext>
+            </a:extLst>
+          </p:cNvPr>
+          <p:cNvSpPr>
+            <a:spLocks noGrp="1"/>
+          </p:cNvSpPr>
+          <p:nvPr>
+            <p:ph type="title"/>
+          </p:nvPr>
+        </p:nvSpPr>
+        <p:spPr/>
+        <p:txBody>
+          <a:bodyPr/>
+          <a:lstStyle/>
+          <a:p>
+            <a:r>
+              <a:rPr lang="en-US" dirty="0"/>
+              <a:t>Lecture Material</a:t>
+            </a:r>
+          </a:p>
+        </p:txBody>
+      </p:sp>
+      <p:sp>
+        <p:nvSpPr>
+          <p:cNvPr id="3" name="Content Placeholder 2">
+            <a:extLst>
+              <a:ext uri="{FF2B5EF4-FFF2-40B4-BE49-F238E27FC236}">
+                <a16:creationId xmlns:a16="http://schemas.microsoft.com/office/drawing/2014/main" id="{50003F46-698E-4FE1-8397-67C3B676A5AA}"/>
+              </a:ext>
+            </a:extLst>
+          </p:cNvPr>
+          <p:cNvSpPr>
+            <a:spLocks noGrp="1"/>
+          </p:cNvSpPr>
+          <p:nvPr>
+            <p:ph idx="1"/>
+          </p:nvPr>
+        </p:nvSpPr>
+        <p:spPr/>
+        <p:txBody>
+          <a:bodyPr>
+            <a:normAutofit/>
+          </a:bodyPr>
+          <a:lstStyle/>
+          <a:p>
+            <a:pPr marL="0" indent="0">
+              <a:buNone/>
+            </a:pPr>
+            <a:r>
+              <a:rPr lang="en-US" sz="2800" dirty="0"/>
+              <a:t>See </a:t>
+            </a:r>
+            <a:r>
+              <a:rPr lang="en-US" sz="2800" b="1" dirty="0"/>
+              <a:t>03-uml-class-diagramming.md</a:t>
+            </a:r>
+            <a:r>
+              <a:rPr lang="en-US" sz="2800" dirty="0"/>
+              <a:t> in the Presentations folder for these topics:</a:t>
+            </a:r>
+          </a:p>
+          <a:p>
+            <a:pPr>
+              <a:buFontTx/>
+              <a:buChar char="-"/>
+            </a:pPr>
+            <a:r>
+              <a:rPr lang="en-US" sz="2800" dirty="0"/>
+              <a:t>Core Concepts and Layout</a:t>
+            </a:r>
+          </a:p>
+          <a:p>
+            <a:pPr>
+              <a:buFontTx/>
+              <a:buChar char="-"/>
+            </a:pPr>
+            <a:r>
+              <a:rPr lang="en-US" sz="2800" dirty="0"/>
+              <a:t>Design constrains (access modifiers)</a:t>
+            </a:r>
+          </a:p>
+          <a:p>
+            <a:pPr>
+              <a:buFontTx/>
+              <a:buChar char="-"/>
+            </a:pPr>
+            <a:r>
+              <a:rPr lang="en-US" sz="2800" dirty="0"/>
+              <a:t>Multiplicity</a:t>
+            </a:r>
+          </a:p>
+        </p:txBody>
+      </p:sp>
+    </p:spTree>
+    <p:extLst>
+      <p:ext uri="{BB962C8B-B14F-4D97-AF65-F5344CB8AC3E}">
+        <p14:creationId xmlns:p14="http://schemas.microsoft.com/office/powerpoint/2010/main" val="586569349"/>
+      </p:ext>
+    </p:extLst>
+  </p:cSld>
+  <p:clrMapOvr>
+    <a:masterClrMapping/>
+  </p:clrMapOvr>
+</p:sld>
+</file>
+
+<file path=ppt/slides/slide30.xml><?xml version="1.0" encoding="utf-8"?>
+<p:sld xmlns:a="http://schemas.openxmlformats.org/drawingml/2006/main" xmlns:r="http://schemas.openxmlformats.org/officeDocument/2006/relationships" xmlns:p="http://schemas.openxmlformats.org/presentationml/2006/main">
+  <p:cSld>
+    <p:spTree>
+      <p:nvGrpSpPr>
+        <p:cNvPr id="1" name=""/>
+        <p:cNvGrpSpPr/>
+        <p:nvPr/>
+      </p:nvGrpSpPr>
+      <p:grpSpPr>
+        <a:xfrm>
+          <a:off x="0" y="0"/>
+          <a:ext cx="0" cy="0"/>
+          <a:chOff x="0" y="0"/>
+          <a:chExt cx="0" cy="0"/>
+        </a:xfrm>
+      </p:grpSpPr>
+      <p:sp>
+        <p:nvSpPr>
           <p:cNvPr id="2" name="Title 1"/>
           <p:cNvSpPr>
             <a:spLocks noGrp="1"/>
@@ -9078,7 +9760,7 @@
 </p:sld>
 </file>
 
-<file path=ppt/slides/slide28.xml><?xml version="1.0" encoding="utf-8"?>
+<file path=ppt/slides/slide31.xml><?xml version="1.0" encoding="utf-8"?>
 <p:sld xmlns:a="http://schemas.openxmlformats.org/drawingml/2006/main" xmlns:r="http://schemas.openxmlformats.org/officeDocument/2006/relationships" xmlns:p="http://schemas.openxmlformats.org/presentationml/2006/main">
   <p:cSld>
     <p:spTree>
@@ -9227,7 +9909,7 @@
 </p:sld>
 </file>
 
-<file path=ppt/slides/slide29.xml><?xml version="1.0" encoding="utf-8"?>
+<file path=ppt/slides/slide32.xml><?xml version="1.0" encoding="utf-8"?>
 <p:sld xmlns:a="http://schemas.openxmlformats.org/drawingml/2006/main" xmlns:r="http://schemas.openxmlformats.org/officeDocument/2006/relationships" xmlns:p="http://schemas.openxmlformats.org/presentationml/2006/main">
   <p:cSld>
     <p:spTree>
@@ -9330,105 +10012,6 @@
         </p:txBody>
       </p:sp>
     </p:spTree>
-  </p:cSld>
-  <p:clrMapOvr>
-    <a:masterClrMapping/>
-  </p:clrMapOvr>
-</p:sld>
-</file>
-
-<file path=ppt/slides/slide3.xml><?xml version="1.0" encoding="utf-8"?>
-<p:sld xmlns:a="http://schemas.openxmlformats.org/drawingml/2006/main" xmlns:r="http://schemas.openxmlformats.org/officeDocument/2006/relationships" xmlns:p="http://schemas.openxmlformats.org/presentationml/2006/main">
-  <p:cSld>
-    <p:spTree>
-      <p:nvGrpSpPr>
-        <p:cNvPr id="1" name=""/>
-        <p:cNvGrpSpPr/>
-        <p:nvPr/>
-      </p:nvGrpSpPr>
-      <p:grpSpPr>
-        <a:xfrm>
-          <a:off x="0" y="0"/>
-          <a:ext cx="0" cy="0"/>
-          <a:chOff x="0" y="0"/>
-          <a:chExt cx="0" cy="0"/>
-        </a:xfrm>
-      </p:grpSpPr>
-      <p:sp>
-        <p:nvSpPr>
-          <p:cNvPr id="2" name="Title 1">
-            <a:extLst>
-              <a:ext uri="{FF2B5EF4-FFF2-40B4-BE49-F238E27FC236}">
-                <a16:creationId xmlns:a16="http://schemas.microsoft.com/office/drawing/2014/main" id="{863445EC-5B27-6C3B-E728-DF9CB64984A0}"/>
-              </a:ext>
-            </a:extLst>
-          </p:cNvPr>
-          <p:cNvSpPr>
-            <a:spLocks noGrp="1"/>
-          </p:cNvSpPr>
-          <p:nvPr>
-            <p:ph type="title"/>
-          </p:nvPr>
-        </p:nvSpPr>
-        <p:spPr/>
-        <p:txBody>
-          <a:bodyPr/>
-          <a:lstStyle/>
-          <a:p>
-            <a:r>
-              <a:rPr lang="en-US" dirty="0"/>
-              <a:t>Lecture Material</a:t>
-            </a:r>
-          </a:p>
-        </p:txBody>
-      </p:sp>
-      <p:sp>
-        <p:nvSpPr>
-          <p:cNvPr id="3" name="Content Placeholder 2">
-            <a:extLst>
-              <a:ext uri="{FF2B5EF4-FFF2-40B4-BE49-F238E27FC236}">
-                <a16:creationId xmlns:a16="http://schemas.microsoft.com/office/drawing/2014/main" id="{50003F46-698E-4FE1-8397-67C3B676A5AA}"/>
-              </a:ext>
-            </a:extLst>
-          </p:cNvPr>
-          <p:cNvSpPr>
-            <a:spLocks noGrp="1"/>
-          </p:cNvSpPr>
-          <p:nvPr>
-            <p:ph idx="1"/>
-          </p:nvPr>
-        </p:nvSpPr>
-        <p:spPr/>
-        <p:txBody>
-          <a:bodyPr>
-            <a:normAutofit/>
-          </a:bodyPr>
-          <a:lstStyle/>
-          <a:p>
-            <a:pPr marL="0" indent="0">
-              <a:buNone/>
-            </a:pPr>
-            <a:r>
-              <a:rPr lang="en-US" sz="2800" dirty="0"/>
-              <a:t>See </a:t>
-            </a:r>
-            <a:r>
-              <a:rPr lang="en-US" sz="2800" b="1" dirty="0"/>
-              <a:t>03-uml-class-diagramming.md</a:t>
-            </a:r>
-            <a:r>
-              <a:rPr lang="en-US" sz="2800" dirty="0"/>
-              <a:t> in the Presentations folder.</a:t>
-            </a:r>
-          </a:p>
-        </p:txBody>
-      </p:sp>
-    </p:spTree>
-    <p:extLst>
-      <p:ext uri="{BB962C8B-B14F-4D97-AF65-F5344CB8AC3E}">
-        <p14:creationId xmlns:p14="http://schemas.microsoft.com/office/powerpoint/2010/main" val="586569349"/>
-      </p:ext>
-    </p:extLst>
   </p:cSld>
   <p:clrMapOvr>
     <a:masterClrMapping/>
@@ -9907,6 +10490,10 @@
           <a:lstStyle/>
           <a:p>
             <a:r>
+              <a:rPr lang="en-US" dirty="0"/>
+              <a:t>Type-Level </a:t>
+            </a:r>
+            <a:r>
               <a:rPr dirty="0"/>
               <a:t>Structural Dependencies</a:t>
             </a:r>
@@ -9994,7 +10581,13 @@
       </p:grpSpPr>
       <p:sp>
         <p:nvSpPr>
-          <p:cNvPr id="2" name="Title 1"/>
+          <p:cNvPr id="2" name="Title 1">
+            <a:extLst>
+              <a:ext uri="{FF2B5EF4-FFF2-40B4-BE49-F238E27FC236}">
+                <a16:creationId xmlns:a16="http://schemas.microsoft.com/office/drawing/2014/main" id="{E4DB5FD6-C4B7-A06D-AB22-2B0C0A9D5393}"/>
+              </a:ext>
+            </a:extLst>
+          </p:cNvPr>
           <p:cNvSpPr>
             <a:spLocks noGrp="1"/>
           </p:cNvSpPr>
@@ -10008,67 +10601,48 @@
           <a:lstStyle/>
           <a:p>
             <a:r>
-              <a:rPr dirty="0"/>
-              <a:t>What Structural Dependencies Reveal</a:t>
-            </a:r>
-          </a:p>
-        </p:txBody>
-      </p:sp>
-      <p:sp>
-        <p:nvSpPr>
-          <p:cNvPr id="3" name="Content Placeholder 2"/>
-          <p:cNvSpPr>
-            <a:spLocks noGrp="1"/>
-          </p:cNvSpPr>
-          <p:nvPr>
-            <p:ph idx="1"/>
-          </p:nvPr>
-        </p:nvSpPr>
-        <p:spPr/>
-        <p:txBody>
-          <a:bodyPr/>
-          <a:lstStyle/>
-          <a:p>
-            <a:pPr marL="0" indent="0">
-              <a:buNone/>
-            </a:pPr>
-            <a:r>
               <a:rPr lang="en-US" dirty="0"/>
-              <a:t>Dense or tangled structures are easier to spot in diagrams than in code. </a:t>
-            </a:r>
-          </a:p>
-          <a:p>
-            <a:pPr marL="0" indent="0">
-              <a:buNone/>
-            </a:pPr>
-            <a:r>
-              <a:rPr lang="en-US" dirty="0"/>
-              <a:t>This is often where students first notice over-coupling or god classes.</a:t>
-            </a:r>
-          </a:p>
-          <a:p>
-            <a:r>
-              <a:rPr dirty="0"/>
-              <a:t>Object lifetime relationships</a:t>
-            </a:r>
-          </a:p>
-          <a:p>
-            <a:pPr lvl="1"/>
-            <a:r>
-              <a:rPr dirty="0"/>
-              <a:t>Tight vs loose coupling</a:t>
-            </a:r>
-          </a:p>
-          <a:p>
-            <a:pPr lvl="1"/>
-            <a:r>
-              <a:rPr dirty="0"/>
-              <a:t>Potential design smells</a:t>
-            </a:r>
-          </a:p>
-        </p:txBody>
-      </p:sp>
+              <a:t>Inheritance / Type-Level Structural</a:t>
+            </a:r>
+          </a:p>
+        </p:txBody>
+      </p:sp>
+      <p:pic>
+        <p:nvPicPr>
+          <p:cNvPr id="4" name="Picture 3">
+            <a:extLst>
+              <a:ext uri="{FF2B5EF4-FFF2-40B4-BE49-F238E27FC236}">
+                <a16:creationId xmlns:a16="http://schemas.microsoft.com/office/drawing/2014/main" id="{BAD5A334-2414-CDA8-4714-6C060783A27D}"/>
+              </a:ext>
+            </a:extLst>
+          </p:cNvPr>
+          <p:cNvPicPr>
+            <a:picLocks noChangeAspect="1"/>
+          </p:cNvPicPr>
+          <p:nvPr/>
+        </p:nvPicPr>
+        <p:blipFill>
+          <a:blip r:embed="rId2"/>
+          <a:stretch>
+            <a:fillRect/>
+          </a:stretch>
+        </p:blipFill>
+        <p:spPr>
+          <a:xfrm>
+            <a:off x="4366943" y="1601078"/>
+            <a:ext cx="3458114" cy="4972715"/>
+          </a:xfrm>
+          <a:prstGeom prst="rect">
+            <a:avLst/>
+          </a:prstGeom>
+        </p:spPr>
+      </p:pic>
     </p:spTree>
+    <p:extLst>
+      <p:ext uri="{BB962C8B-B14F-4D97-AF65-F5344CB8AC3E}">
+        <p14:creationId xmlns:p14="http://schemas.microsoft.com/office/powerpoint/2010/main" val="2685170452"/>
+      </p:ext>
+    </p:extLst>
   </p:cSld>
   <p:clrMapOvr>
     <a:masterClrMapping/>

</xml_diff>